<commit_message>
Added bitbucket code link, finished presentation.
</commit_message>
<xml_diff>
--- a/UnitTestPresentation.pptx
+++ b/UnitTestPresentation.pptx
@@ -7,13 +7,20 @@
   <p:sldIdLst>
     <p:sldId id="256" r:id="rId2"/>
     <p:sldId id="257" r:id="rId3"/>
-    <p:sldId id="260" r:id="rId4"/>
-    <p:sldId id="259" r:id="rId5"/>
+    <p:sldId id="259" r:id="rId4"/>
+    <p:sldId id="260" r:id="rId5"/>
     <p:sldId id="261" r:id="rId6"/>
     <p:sldId id="258" r:id="rId7"/>
     <p:sldId id="262" r:id="rId8"/>
     <p:sldId id="263" r:id="rId9"/>
     <p:sldId id="264" r:id="rId10"/>
+    <p:sldId id="265" r:id="rId11"/>
+    <p:sldId id="266" r:id="rId12"/>
+    <p:sldId id="267" r:id="rId13"/>
+    <p:sldId id="268" r:id="rId14"/>
+    <p:sldId id="269" r:id="rId15"/>
+    <p:sldId id="271" r:id="rId16"/>
+    <p:sldId id="270" r:id="rId17"/>
   </p:sldIdLst>
   <p:sldSz cx="12192000" cy="6858000"/>
   <p:notesSz cx="6858000" cy="9144000"/>
@@ -306,7 +313,7 @@
           <a:p>
             <a:fld id="{C68768EB-7F76-4C47-A6BC-32F475BABAC0}" type="datetimeFigureOut">
               <a:rPr lang="en-US" smtClean="0"/>
-              <a:t>3/15/2016</a:t>
+              <a:t>3/16/2016</a:t>
             </a:fld>
             <a:endParaRPr lang="en-US"/>
           </a:p>
@@ -581,7 +588,7 @@
           <a:p>
             <a:fld id="{C68768EB-7F76-4C47-A6BC-32F475BABAC0}" type="datetimeFigureOut">
               <a:rPr lang="en-US" smtClean="0"/>
-              <a:t>3/15/2016</a:t>
+              <a:t>3/16/2016</a:t>
             </a:fld>
             <a:endParaRPr lang="en-US"/>
           </a:p>
@@ -775,7 +782,7 @@
           <a:p>
             <a:fld id="{C68768EB-7F76-4C47-A6BC-32F475BABAC0}" type="datetimeFigureOut">
               <a:rPr lang="en-US" smtClean="0"/>
-              <a:t>3/15/2016</a:t>
+              <a:t>3/16/2016</a:t>
             </a:fld>
             <a:endParaRPr lang="en-US"/>
           </a:p>
@@ -1048,7 +1055,7 @@
           <a:p>
             <a:fld id="{C68768EB-7F76-4C47-A6BC-32F475BABAC0}" type="datetimeFigureOut">
               <a:rPr lang="en-US" smtClean="0"/>
-              <a:t>3/15/2016</a:t>
+              <a:t>3/16/2016</a:t>
             </a:fld>
             <a:endParaRPr lang="en-US"/>
           </a:p>
@@ -1389,7 +1396,7 @@
           <a:p>
             <a:fld id="{C68768EB-7F76-4C47-A6BC-32F475BABAC0}" type="datetimeFigureOut">
               <a:rPr lang="en-US" smtClean="0"/>
-              <a:t>3/15/2016</a:t>
+              <a:t>3/16/2016</a:t>
             </a:fld>
             <a:endParaRPr lang="en-US"/>
           </a:p>
@@ -2012,7 +2019,7 @@
           <a:p>
             <a:fld id="{C68768EB-7F76-4C47-A6BC-32F475BABAC0}" type="datetimeFigureOut">
               <a:rPr lang="en-US" smtClean="0"/>
-              <a:t>3/15/2016</a:t>
+              <a:t>3/16/2016</a:t>
             </a:fld>
             <a:endParaRPr lang="en-US"/>
           </a:p>
@@ -2872,7 +2879,7 @@
           <a:p>
             <a:fld id="{C68768EB-7F76-4C47-A6BC-32F475BABAC0}" type="datetimeFigureOut">
               <a:rPr lang="en-US" smtClean="0"/>
-              <a:t>3/15/2016</a:t>
+              <a:t>3/16/2016</a:t>
             </a:fld>
             <a:endParaRPr lang="en-US"/>
           </a:p>
@@ -3042,7 +3049,7 @@
           <a:p>
             <a:fld id="{C68768EB-7F76-4C47-A6BC-32F475BABAC0}" type="datetimeFigureOut">
               <a:rPr lang="en-US" smtClean="0"/>
-              <a:t>3/15/2016</a:t>
+              <a:t>3/16/2016</a:t>
             </a:fld>
             <a:endParaRPr lang="en-US"/>
           </a:p>
@@ -3222,7 +3229,7 @@
           <a:p>
             <a:fld id="{C68768EB-7F76-4C47-A6BC-32F475BABAC0}" type="datetimeFigureOut">
               <a:rPr lang="en-US" smtClean="0"/>
-              <a:t>3/15/2016</a:t>
+              <a:t>3/16/2016</a:t>
             </a:fld>
             <a:endParaRPr lang="en-US"/>
           </a:p>
@@ -3392,7 +3399,7 @@
           <a:p>
             <a:fld id="{C68768EB-7F76-4C47-A6BC-32F475BABAC0}" type="datetimeFigureOut">
               <a:rPr lang="en-US" smtClean="0"/>
-              <a:t>3/15/2016</a:t>
+              <a:t>3/16/2016</a:t>
             </a:fld>
             <a:endParaRPr lang="en-US"/>
           </a:p>
@@ -3639,7 +3646,7 @@
           <a:p>
             <a:fld id="{C68768EB-7F76-4C47-A6BC-32F475BABAC0}" type="datetimeFigureOut">
               <a:rPr lang="en-US" smtClean="0"/>
-              <a:t>3/15/2016</a:t>
+              <a:t>3/16/2016</a:t>
             </a:fld>
             <a:endParaRPr lang="en-US"/>
           </a:p>
@@ -3931,7 +3938,7 @@
           <a:p>
             <a:fld id="{C68768EB-7F76-4C47-A6BC-32F475BABAC0}" type="datetimeFigureOut">
               <a:rPr lang="en-US" smtClean="0"/>
-              <a:t>3/15/2016</a:t>
+              <a:t>3/16/2016</a:t>
             </a:fld>
             <a:endParaRPr lang="en-US"/>
           </a:p>
@@ -4375,7 +4382,7 @@
           <a:p>
             <a:fld id="{C68768EB-7F76-4C47-A6BC-32F475BABAC0}" type="datetimeFigureOut">
               <a:rPr lang="en-US" smtClean="0"/>
-              <a:t>3/15/2016</a:t>
+              <a:t>3/16/2016</a:t>
             </a:fld>
             <a:endParaRPr lang="en-US"/>
           </a:p>
@@ -4493,7 +4500,7 @@
           <a:p>
             <a:fld id="{C68768EB-7F76-4C47-A6BC-32F475BABAC0}" type="datetimeFigureOut">
               <a:rPr lang="en-US" smtClean="0"/>
-              <a:t>3/15/2016</a:t>
+              <a:t>3/16/2016</a:t>
             </a:fld>
             <a:endParaRPr lang="en-US"/>
           </a:p>
@@ -4588,7 +4595,7 @@
           <a:p>
             <a:fld id="{C68768EB-7F76-4C47-A6BC-32F475BABAC0}" type="datetimeFigureOut">
               <a:rPr lang="en-US" smtClean="0"/>
-              <a:t>3/15/2016</a:t>
+              <a:t>3/16/2016</a:t>
             </a:fld>
             <a:endParaRPr lang="en-US"/>
           </a:p>
@@ -4867,7 +4874,7 @@
           <a:p>
             <a:fld id="{C68768EB-7F76-4C47-A6BC-32F475BABAC0}" type="datetimeFigureOut">
               <a:rPr lang="en-US" smtClean="0"/>
-              <a:t>3/15/2016</a:t>
+              <a:t>3/16/2016</a:t>
             </a:fld>
             <a:endParaRPr lang="en-US"/>
           </a:p>
@@ -5142,7 +5149,7 @@
           <a:p>
             <a:fld id="{C68768EB-7F76-4C47-A6BC-32F475BABAC0}" type="datetimeFigureOut">
               <a:rPr lang="en-US" smtClean="0"/>
-              <a:t>3/15/2016</a:t>
+              <a:t>3/16/2016</a:t>
             </a:fld>
             <a:endParaRPr lang="en-US"/>
           </a:p>
@@ -5571,7 +5578,7 @@
           <a:p>
             <a:fld id="{C68768EB-7F76-4C47-A6BC-32F475BABAC0}" type="datetimeFigureOut">
               <a:rPr lang="en-US" smtClean="0"/>
-              <a:t>3/15/2016</a:t>
+              <a:t>3/16/2016</a:t>
             </a:fld>
             <a:endParaRPr lang="en-US"/>
           </a:p>
@@ -6158,6 +6165,1078 @@
 </p:sld>
 </file>
 
+<file path=ppt/slides/slide10.xml><?xml version="1.0" encoding="utf-8"?>
+<p:sld xmlns:a="http://schemas.openxmlformats.org/drawingml/2006/main" xmlns:r="http://schemas.openxmlformats.org/officeDocument/2006/relationships" xmlns:p="http://schemas.openxmlformats.org/presentationml/2006/main">
+  <p:cSld>
+    <p:spTree>
+      <p:nvGrpSpPr>
+        <p:cNvPr id="1" name=""/>
+        <p:cNvGrpSpPr/>
+        <p:nvPr/>
+      </p:nvGrpSpPr>
+      <p:grpSpPr>
+        <a:xfrm>
+          <a:off x="0" y="0"/>
+          <a:ext cx="0" cy="0"/>
+          <a:chOff x="0" y="0"/>
+          <a:chExt cx="0" cy="0"/>
+        </a:xfrm>
+      </p:grpSpPr>
+      <p:sp>
+        <p:nvSpPr>
+          <p:cNvPr id="2" name="Title 1"/>
+          <p:cNvSpPr>
+            <a:spLocks noGrp="1"/>
+          </p:cNvSpPr>
+          <p:nvPr>
+            <p:ph type="title"/>
+          </p:nvPr>
+        </p:nvSpPr>
+        <p:spPr/>
+        <p:txBody>
+          <a:bodyPr/>
+          <a:lstStyle/>
+          <a:p>
+            <a:r>
+              <a:rPr lang="en-US" dirty="0" smtClean="0"/>
+              <a:t>Dependency Injection</a:t>
+            </a:r>
+            <a:endParaRPr lang="en-US" dirty="0"/>
+          </a:p>
+        </p:txBody>
+      </p:sp>
+      <p:sp>
+        <p:nvSpPr>
+          <p:cNvPr id="3" name="Content Placeholder 2"/>
+          <p:cNvSpPr>
+            <a:spLocks noGrp="1"/>
+          </p:cNvSpPr>
+          <p:nvPr>
+            <p:ph idx="1"/>
+          </p:nvPr>
+        </p:nvSpPr>
+        <p:spPr/>
+        <p:txBody>
+          <a:bodyPr/>
+          <a:lstStyle/>
+          <a:p>
+            <a:r>
+              <a:rPr lang="en-US" dirty="0" smtClean="0"/>
+              <a:t>Using Constructor Injection</a:t>
+            </a:r>
+          </a:p>
+          <a:p>
+            <a:r>
+              <a:rPr lang="en-US" dirty="0" smtClean="0"/>
+              <a:t>Using Property Injection (most commonly called Dependency Injection, although all items technically are)</a:t>
+            </a:r>
+          </a:p>
+          <a:p>
+            <a:r>
+              <a:rPr lang="en-US" dirty="0" smtClean="0"/>
+              <a:t>Using a factory class</a:t>
+            </a:r>
+          </a:p>
+          <a:p>
+            <a:endParaRPr lang="en-US" dirty="0"/>
+          </a:p>
+          <a:p>
+            <a:r>
+              <a:rPr lang="en-US" dirty="0" smtClean="0"/>
+              <a:t>We will cover Constructor Injection</a:t>
+            </a:r>
+            <a:endParaRPr lang="en-US" dirty="0"/>
+          </a:p>
+        </p:txBody>
+      </p:sp>
+    </p:spTree>
+    <p:extLst>
+      <p:ext uri="{BB962C8B-B14F-4D97-AF65-F5344CB8AC3E}">
+        <p14:creationId xmlns:p14="http://schemas.microsoft.com/office/powerpoint/2010/main" val="1045386513"/>
+      </p:ext>
+    </p:extLst>
+  </p:cSld>
+  <p:clrMapOvr>
+    <a:masterClrMapping/>
+  </p:clrMapOvr>
+</p:sld>
+</file>
+
+<file path=ppt/slides/slide11.xml><?xml version="1.0" encoding="utf-8"?>
+<p:sld xmlns:a="http://schemas.openxmlformats.org/drawingml/2006/main" xmlns:r="http://schemas.openxmlformats.org/officeDocument/2006/relationships" xmlns:p="http://schemas.openxmlformats.org/presentationml/2006/main">
+  <p:cSld>
+    <p:spTree>
+      <p:nvGrpSpPr>
+        <p:cNvPr id="1" name=""/>
+        <p:cNvGrpSpPr/>
+        <p:nvPr/>
+      </p:nvGrpSpPr>
+      <p:grpSpPr>
+        <a:xfrm>
+          <a:off x="0" y="0"/>
+          <a:ext cx="0" cy="0"/>
+          <a:chOff x="0" y="0"/>
+          <a:chExt cx="0" cy="0"/>
+        </a:xfrm>
+      </p:grpSpPr>
+      <p:sp>
+        <p:nvSpPr>
+          <p:cNvPr id="2" name="Title 1"/>
+          <p:cNvSpPr>
+            <a:spLocks noGrp="1"/>
+          </p:cNvSpPr>
+          <p:nvPr>
+            <p:ph type="title"/>
+          </p:nvPr>
+        </p:nvSpPr>
+        <p:spPr/>
+        <p:txBody>
+          <a:bodyPr/>
+          <a:lstStyle/>
+          <a:p>
+            <a:r>
+              <a:rPr lang="en-US" dirty="0" smtClean="0"/>
+              <a:t>Constructor Injection</a:t>
+            </a:r>
+            <a:endParaRPr lang="en-US" dirty="0"/>
+          </a:p>
+        </p:txBody>
+      </p:sp>
+      <p:sp>
+        <p:nvSpPr>
+          <p:cNvPr id="3" name="Content Placeholder 2"/>
+          <p:cNvSpPr>
+            <a:spLocks noGrp="1"/>
+          </p:cNvSpPr>
+          <p:nvPr>
+            <p:ph idx="1"/>
+          </p:nvPr>
+        </p:nvSpPr>
+        <p:spPr/>
+        <p:txBody>
+          <a:bodyPr/>
+          <a:lstStyle/>
+          <a:p>
+            <a:r>
+              <a:rPr lang="en-US" dirty="0" smtClean="0"/>
+              <a:t>Easiest, most readable</a:t>
+            </a:r>
+          </a:p>
+          <a:p>
+            <a:r>
+              <a:rPr lang="en-US" dirty="0" smtClean="0"/>
+              <a:t>Can get complicated and hard to maintain if the code under tests uses a lot of constructors</a:t>
+            </a:r>
+          </a:p>
+          <a:p>
+            <a:endParaRPr lang="en-US" dirty="0"/>
+          </a:p>
+        </p:txBody>
+      </p:sp>
+    </p:spTree>
+    <p:extLst>
+      <p:ext uri="{BB962C8B-B14F-4D97-AF65-F5344CB8AC3E}">
+        <p14:creationId xmlns:p14="http://schemas.microsoft.com/office/powerpoint/2010/main" val="1663355157"/>
+      </p:ext>
+    </p:extLst>
+  </p:cSld>
+  <p:clrMapOvr>
+    <a:masterClrMapping/>
+  </p:clrMapOvr>
+</p:sld>
+</file>
+
+<file path=ppt/slides/slide12.xml><?xml version="1.0" encoding="utf-8"?>
+<p:sld xmlns:a="http://schemas.openxmlformats.org/drawingml/2006/main" xmlns:r="http://schemas.openxmlformats.org/officeDocument/2006/relationships" xmlns:p="http://schemas.openxmlformats.org/presentationml/2006/main">
+  <p:cSld>
+    <p:spTree>
+      <p:nvGrpSpPr>
+        <p:cNvPr id="1" name=""/>
+        <p:cNvGrpSpPr/>
+        <p:nvPr/>
+      </p:nvGrpSpPr>
+      <p:grpSpPr>
+        <a:xfrm>
+          <a:off x="0" y="0"/>
+          <a:ext cx="0" cy="0"/>
+          <a:chOff x="0" y="0"/>
+          <a:chExt cx="0" cy="0"/>
+        </a:xfrm>
+      </p:grpSpPr>
+      <p:sp>
+        <p:nvSpPr>
+          <p:cNvPr id="2" name="Title 1"/>
+          <p:cNvSpPr>
+            <a:spLocks noGrp="1"/>
+          </p:cNvSpPr>
+          <p:nvPr>
+            <p:ph type="title"/>
+          </p:nvPr>
+        </p:nvSpPr>
+        <p:spPr/>
+        <p:txBody>
+          <a:bodyPr/>
+          <a:lstStyle/>
+          <a:p>
+            <a:r>
+              <a:rPr lang="en-US" dirty="0" smtClean="0"/>
+              <a:t>Original Code</a:t>
+            </a:r>
+            <a:endParaRPr lang="en-US" dirty="0"/>
+          </a:p>
+        </p:txBody>
+      </p:sp>
+      <p:sp>
+        <p:nvSpPr>
+          <p:cNvPr id="3" name="Content Placeholder 2"/>
+          <p:cNvSpPr>
+            <a:spLocks noGrp="1"/>
+          </p:cNvSpPr>
+          <p:nvPr>
+            <p:ph idx="1"/>
+          </p:nvPr>
+        </p:nvSpPr>
+        <p:spPr/>
+        <p:txBody>
+          <a:bodyPr/>
+          <a:lstStyle/>
+          <a:p>
+            <a:pPr marL="0" indent="0">
+              <a:buNone/>
+            </a:pPr>
+            <a:r>
+              <a:rPr lang="en-US" dirty="0"/>
+              <a:t>public bool </a:t>
+            </a:r>
+            <a:r>
+              <a:rPr lang="en-US" dirty="0" err="1"/>
+              <a:t>IsValidLogFileName</a:t>
+            </a:r>
+            <a:r>
+              <a:rPr lang="en-US" dirty="0"/>
+              <a:t>(string </a:t>
+            </a:r>
+            <a:r>
+              <a:rPr lang="en-US" dirty="0" err="1"/>
+              <a:t>fileName</a:t>
+            </a:r>
+            <a:r>
+              <a:rPr lang="en-US" dirty="0"/>
+              <a:t>)</a:t>
+            </a:r>
+          </a:p>
+          <a:p>
+            <a:pPr marL="0" indent="0">
+              <a:buNone/>
+            </a:pPr>
+            <a:r>
+              <a:rPr lang="en-US" dirty="0"/>
+              <a:t>        {</a:t>
+            </a:r>
+          </a:p>
+          <a:p>
+            <a:pPr marL="0" indent="0">
+              <a:buNone/>
+            </a:pPr>
+            <a:r>
+              <a:rPr lang="en-US" dirty="0"/>
+              <a:t>            if (</a:t>
+            </a:r>
+            <a:r>
+              <a:rPr lang="en-US" dirty="0" err="1"/>
+              <a:t>fileName.EndsWith</a:t>
+            </a:r>
+            <a:r>
+              <a:rPr lang="en-US" dirty="0"/>
+              <a:t>(".foo"))</a:t>
+            </a:r>
+          </a:p>
+          <a:p>
+            <a:pPr marL="0" indent="0">
+              <a:buNone/>
+            </a:pPr>
+            <a:r>
+              <a:rPr lang="en-US" dirty="0"/>
+              <a:t>            {</a:t>
+            </a:r>
+          </a:p>
+          <a:p>
+            <a:pPr marL="0" indent="0">
+              <a:buNone/>
+            </a:pPr>
+            <a:r>
+              <a:rPr lang="en-US" dirty="0"/>
+              <a:t>                return false;</a:t>
+            </a:r>
+          </a:p>
+          <a:p>
+            <a:pPr marL="0" indent="0">
+              <a:buNone/>
+            </a:pPr>
+            <a:r>
+              <a:rPr lang="en-US" dirty="0"/>
+              <a:t>            }</a:t>
+            </a:r>
+          </a:p>
+          <a:p>
+            <a:pPr marL="0" indent="0">
+              <a:buNone/>
+            </a:pPr>
+            <a:r>
+              <a:rPr lang="en-US" dirty="0"/>
+              <a:t>            return true;</a:t>
+            </a:r>
+          </a:p>
+          <a:p>
+            <a:pPr marL="0" indent="0">
+              <a:buNone/>
+            </a:pPr>
+            <a:r>
+              <a:rPr lang="en-US" dirty="0"/>
+              <a:t>        }</a:t>
+            </a:r>
+            <a:endParaRPr lang="en-US" dirty="0"/>
+          </a:p>
+        </p:txBody>
+      </p:sp>
+    </p:spTree>
+    <p:extLst>
+      <p:ext uri="{BB962C8B-B14F-4D97-AF65-F5344CB8AC3E}">
+        <p14:creationId xmlns:p14="http://schemas.microsoft.com/office/powerpoint/2010/main" val="3509692673"/>
+      </p:ext>
+    </p:extLst>
+  </p:cSld>
+  <p:clrMapOvr>
+    <a:masterClrMapping/>
+  </p:clrMapOvr>
+</p:sld>
+</file>
+
+<file path=ppt/slides/slide13.xml><?xml version="1.0" encoding="utf-8"?>
+<p:sld xmlns:a="http://schemas.openxmlformats.org/drawingml/2006/main" xmlns:r="http://schemas.openxmlformats.org/officeDocument/2006/relationships" xmlns:p="http://schemas.openxmlformats.org/presentationml/2006/main">
+  <p:cSld>
+    <p:spTree>
+      <p:nvGrpSpPr>
+        <p:cNvPr id="1" name=""/>
+        <p:cNvGrpSpPr/>
+        <p:nvPr/>
+      </p:nvGrpSpPr>
+      <p:grpSpPr>
+        <a:xfrm>
+          <a:off x="0" y="0"/>
+          <a:ext cx="0" cy="0"/>
+          <a:chOff x="0" y="0"/>
+          <a:chExt cx="0" cy="0"/>
+        </a:xfrm>
+      </p:grpSpPr>
+      <p:sp>
+        <p:nvSpPr>
+          <p:cNvPr id="2" name="Title 1"/>
+          <p:cNvSpPr>
+            <a:spLocks noGrp="1"/>
+          </p:cNvSpPr>
+          <p:nvPr>
+            <p:ph type="title"/>
+          </p:nvPr>
+        </p:nvSpPr>
+        <p:spPr/>
+        <p:txBody>
+          <a:bodyPr/>
+          <a:lstStyle/>
+          <a:p>
+            <a:r>
+              <a:rPr lang="en-US" dirty="0" smtClean="0"/>
+              <a:t>Refactored</a:t>
+            </a:r>
+            <a:endParaRPr lang="en-US" dirty="0"/>
+          </a:p>
+        </p:txBody>
+      </p:sp>
+      <p:sp>
+        <p:nvSpPr>
+          <p:cNvPr id="3" name="Content Placeholder 2"/>
+          <p:cNvSpPr>
+            <a:spLocks noGrp="1"/>
+          </p:cNvSpPr>
+          <p:nvPr>
+            <p:ph idx="1"/>
+          </p:nvPr>
+        </p:nvSpPr>
+        <p:spPr>
+          <a:xfrm>
+            <a:off x="1103312" y="1528012"/>
+            <a:ext cx="8946541" cy="4720388"/>
+          </a:xfrm>
+        </p:spPr>
+        <p:txBody>
+          <a:bodyPr>
+            <a:normAutofit/>
+          </a:bodyPr>
+          <a:lstStyle/>
+          <a:p>
+            <a:pPr marL="0" indent="0">
+              <a:buNone/>
+            </a:pPr>
+            <a:r>
+              <a:rPr lang="en-US" dirty="0"/>
+              <a:t>public class </a:t>
+            </a:r>
+            <a:r>
+              <a:rPr lang="en-US" dirty="0" err="1"/>
+              <a:t>FileExtensionManager</a:t>
+            </a:r>
+            <a:r>
+              <a:rPr lang="en-US" dirty="0"/>
+              <a:t> : </a:t>
+            </a:r>
+            <a:r>
+              <a:rPr lang="en-US" dirty="0" err="1"/>
+              <a:t>IFileExtensionManager</a:t>
+            </a:r>
+            <a:endParaRPr lang="en-US" dirty="0"/>
+          </a:p>
+          <a:p>
+            <a:pPr marL="0" indent="0">
+              <a:buNone/>
+            </a:pPr>
+            <a:r>
+              <a:rPr lang="en-US" dirty="0"/>
+              <a:t>    </a:t>
+            </a:r>
+            <a:r>
+              <a:rPr lang="en-US" dirty="0" smtClean="0"/>
+              <a:t>{</a:t>
+            </a:r>
+            <a:endParaRPr lang="en-US" dirty="0"/>
+          </a:p>
+          <a:p>
+            <a:pPr marL="0" indent="0">
+              <a:buNone/>
+            </a:pPr>
+            <a:r>
+              <a:rPr lang="en-US" dirty="0"/>
+              <a:t>        public bool </a:t>
+            </a:r>
+            <a:r>
+              <a:rPr lang="en-US" dirty="0" err="1"/>
+              <a:t>IsValid</a:t>
+            </a:r>
+            <a:r>
+              <a:rPr lang="en-US" dirty="0"/>
+              <a:t>(string </a:t>
+            </a:r>
+            <a:r>
+              <a:rPr lang="en-US" dirty="0" err="1"/>
+              <a:t>fileName</a:t>
+            </a:r>
+            <a:r>
+              <a:rPr lang="en-US" dirty="0"/>
+              <a:t>)</a:t>
+            </a:r>
+          </a:p>
+          <a:p>
+            <a:pPr marL="0" indent="0">
+              <a:buNone/>
+            </a:pPr>
+            <a:r>
+              <a:rPr lang="en-US" dirty="0"/>
+              <a:t>        {</a:t>
+            </a:r>
+          </a:p>
+          <a:p>
+            <a:pPr marL="0" indent="0">
+              <a:buNone/>
+            </a:pPr>
+            <a:r>
+              <a:rPr lang="en-US" dirty="0" smtClean="0"/>
+              <a:t>		   if </a:t>
+            </a:r>
+            <a:r>
+              <a:rPr lang="en-US" dirty="0"/>
+              <a:t>(</a:t>
+            </a:r>
+            <a:r>
+              <a:rPr lang="en-US" dirty="0" err="1"/>
+              <a:t>fileName.EndsWith</a:t>
+            </a:r>
+            <a:r>
+              <a:rPr lang="en-US" dirty="0"/>
+              <a:t>(".foo"))</a:t>
+            </a:r>
+          </a:p>
+          <a:p>
+            <a:pPr marL="0" indent="0">
+              <a:buNone/>
+            </a:pPr>
+            <a:r>
+              <a:rPr lang="en-US" dirty="0"/>
+              <a:t>            {</a:t>
+            </a:r>
+          </a:p>
+          <a:p>
+            <a:pPr marL="0" indent="0">
+              <a:buNone/>
+            </a:pPr>
+            <a:r>
+              <a:rPr lang="en-US" dirty="0"/>
+              <a:t>                return false;</a:t>
+            </a:r>
+          </a:p>
+          <a:p>
+            <a:pPr marL="0" indent="0">
+              <a:buNone/>
+            </a:pPr>
+            <a:r>
+              <a:rPr lang="en-US" dirty="0"/>
+              <a:t>            }</a:t>
+            </a:r>
+          </a:p>
+          <a:p>
+            <a:pPr marL="0" indent="0">
+              <a:buNone/>
+            </a:pPr>
+            <a:r>
+              <a:rPr lang="en-US" dirty="0"/>
+              <a:t>            return true;</a:t>
+            </a:r>
+          </a:p>
+          <a:p>
+            <a:pPr marL="0" indent="0">
+              <a:buNone/>
+            </a:pPr>
+            <a:r>
+              <a:rPr lang="en-US" dirty="0"/>
+              <a:t>        }</a:t>
+            </a:r>
+          </a:p>
+          <a:p>
+            <a:pPr marL="0" indent="0">
+              <a:buNone/>
+            </a:pPr>
+            <a:r>
+              <a:rPr lang="en-US" dirty="0"/>
+              <a:t>    }</a:t>
+            </a:r>
+            <a:endParaRPr lang="en-US" dirty="0"/>
+          </a:p>
+        </p:txBody>
+      </p:sp>
+    </p:spTree>
+    <p:extLst>
+      <p:ext uri="{BB962C8B-B14F-4D97-AF65-F5344CB8AC3E}">
+        <p14:creationId xmlns:p14="http://schemas.microsoft.com/office/powerpoint/2010/main" val="3015367097"/>
+      </p:ext>
+    </p:extLst>
+  </p:cSld>
+  <p:clrMapOvr>
+    <a:masterClrMapping/>
+  </p:clrMapOvr>
+</p:sld>
+</file>
+
+<file path=ppt/slides/slide14.xml><?xml version="1.0" encoding="utf-8"?>
+<p:sld xmlns:a="http://schemas.openxmlformats.org/drawingml/2006/main" xmlns:r="http://schemas.openxmlformats.org/officeDocument/2006/relationships" xmlns:p="http://schemas.openxmlformats.org/presentationml/2006/main">
+  <p:cSld>
+    <p:spTree>
+      <p:nvGrpSpPr>
+        <p:cNvPr id="1" name=""/>
+        <p:cNvGrpSpPr/>
+        <p:nvPr/>
+      </p:nvGrpSpPr>
+      <p:grpSpPr>
+        <a:xfrm>
+          <a:off x="0" y="0"/>
+          <a:ext cx="0" cy="0"/>
+          <a:chOff x="0" y="0"/>
+          <a:chExt cx="0" cy="0"/>
+        </a:xfrm>
+      </p:grpSpPr>
+      <p:sp>
+        <p:nvSpPr>
+          <p:cNvPr id="2" name="Title 1"/>
+          <p:cNvSpPr>
+            <a:spLocks noGrp="1"/>
+          </p:cNvSpPr>
+          <p:nvPr>
+            <p:ph type="title"/>
+          </p:nvPr>
+        </p:nvSpPr>
+        <p:spPr/>
+        <p:txBody>
+          <a:bodyPr/>
+          <a:lstStyle/>
+          <a:p>
+            <a:r>
+              <a:rPr lang="en-US" dirty="0" smtClean="0"/>
+              <a:t>Stub for Testing</a:t>
+            </a:r>
+            <a:endParaRPr lang="en-US" dirty="0"/>
+          </a:p>
+        </p:txBody>
+      </p:sp>
+      <p:sp>
+        <p:nvSpPr>
+          <p:cNvPr id="3" name="Content Placeholder 2"/>
+          <p:cNvSpPr>
+            <a:spLocks noGrp="1"/>
+          </p:cNvSpPr>
+          <p:nvPr>
+            <p:ph idx="1"/>
+          </p:nvPr>
+        </p:nvSpPr>
+        <p:spPr>
+          <a:xfrm>
+            <a:off x="1103312" y="2052918"/>
+            <a:ext cx="10001835" cy="4195481"/>
+          </a:xfrm>
+        </p:spPr>
+        <p:txBody>
+          <a:bodyPr/>
+          <a:lstStyle/>
+          <a:p>
+            <a:pPr marL="0" indent="0">
+              <a:buNone/>
+            </a:pPr>
+            <a:r>
+              <a:rPr lang="en-US" dirty="0"/>
+              <a:t>public class </a:t>
+            </a:r>
+            <a:r>
+              <a:rPr lang="en-US" dirty="0" err="1"/>
+              <a:t>AlwaysValidFakeExtensionManager</a:t>
+            </a:r>
+            <a:r>
+              <a:rPr lang="en-US" dirty="0"/>
+              <a:t> : </a:t>
+            </a:r>
+            <a:r>
+              <a:rPr lang="en-US" dirty="0" err="1"/>
+              <a:t>IFileExtensionManager</a:t>
+            </a:r>
+            <a:endParaRPr lang="en-US" dirty="0"/>
+          </a:p>
+          <a:p>
+            <a:pPr marL="0" indent="0">
+              <a:buNone/>
+            </a:pPr>
+            <a:r>
+              <a:rPr lang="en-US" dirty="0"/>
+              <a:t>    {</a:t>
+            </a:r>
+          </a:p>
+          <a:p>
+            <a:pPr marL="0" indent="0">
+              <a:buNone/>
+            </a:pPr>
+            <a:r>
+              <a:rPr lang="en-US" dirty="0"/>
+              <a:t>        //Stub for use in Dependency injection</a:t>
+            </a:r>
+          </a:p>
+          <a:p>
+            <a:pPr marL="0" indent="0">
+              <a:buNone/>
+            </a:pPr>
+            <a:r>
+              <a:rPr lang="en-US" dirty="0"/>
+              <a:t>        public bool </a:t>
+            </a:r>
+            <a:r>
+              <a:rPr lang="en-US" dirty="0" err="1"/>
+              <a:t>IsValid</a:t>
+            </a:r>
+            <a:r>
+              <a:rPr lang="en-US" dirty="0"/>
+              <a:t>(string </a:t>
+            </a:r>
+            <a:r>
+              <a:rPr lang="en-US" dirty="0" err="1"/>
+              <a:t>fileName</a:t>
+            </a:r>
+            <a:r>
+              <a:rPr lang="en-US" dirty="0"/>
+              <a:t>)</a:t>
+            </a:r>
+          </a:p>
+          <a:p>
+            <a:pPr marL="0" indent="0">
+              <a:buNone/>
+            </a:pPr>
+            <a:r>
+              <a:rPr lang="en-US" dirty="0"/>
+              <a:t>        {</a:t>
+            </a:r>
+          </a:p>
+          <a:p>
+            <a:pPr marL="0" indent="0">
+              <a:buNone/>
+            </a:pPr>
+            <a:r>
+              <a:rPr lang="en-US" dirty="0"/>
+              <a:t>            return true;</a:t>
+            </a:r>
+          </a:p>
+          <a:p>
+            <a:pPr marL="0" indent="0">
+              <a:buNone/>
+            </a:pPr>
+            <a:r>
+              <a:rPr lang="en-US" dirty="0"/>
+              <a:t>        }</a:t>
+            </a:r>
+          </a:p>
+          <a:p>
+            <a:pPr marL="0" indent="0">
+              <a:buNone/>
+            </a:pPr>
+            <a:r>
+              <a:rPr lang="en-US" dirty="0"/>
+              <a:t>    }</a:t>
+            </a:r>
+            <a:endParaRPr lang="en-US" dirty="0"/>
+          </a:p>
+        </p:txBody>
+      </p:sp>
+    </p:spTree>
+    <p:extLst>
+      <p:ext uri="{BB962C8B-B14F-4D97-AF65-F5344CB8AC3E}">
+        <p14:creationId xmlns:p14="http://schemas.microsoft.com/office/powerpoint/2010/main" val="2272522962"/>
+      </p:ext>
+    </p:extLst>
+  </p:cSld>
+  <p:clrMapOvr>
+    <a:masterClrMapping/>
+  </p:clrMapOvr>
+</p:sld>
+</file>
+
+<file path=ppt/slides/slide15.xml><?xml version="1.0" encoding="utf-8"?>
+<p:sld xmlns:a="http://schemas.openxmlformats.org/drawingml/2006/main" xmlns:r="http://schemas.openxmlformats.org/officeDocument/2006/relationships" xmlns:p="http://schemas.openxmlformats.org/presentationml/2006/main">
+  <p:cSld>
+    <p:spTree>
+      <p:nvGrpSpPr>
+        <p:cNvPr id="1" name=""/>
+        <p:cNvGrpSpPr/>
+        <p:nvPr/>
+      </p:nvGrpSpPr>
+      <p:grpSpPr>
+        <a:xfrm>
+          <a:off x="0" y="0"/>
+          <a:ext cx="0" cy="0"/>
+          <a:chOff x="0" y="0"/>
+          <a:chExt cx="0" cy="0"/>
+        </a:xfrm>
+      </p:grpSpPr>
+      <p:sp>
+        <p:nvSpPr>
+          <p:cNvPr id="2" name="Title 1"/>
+          <p:cNvSpPr>
+            <a:spLocks noGrp="1"/>
+          </p:cNvSpPr>
+          <p:nvPr>
+            <p:ph type="title"/>
+          </p:nvPr>
+        </p:nvSpPr>
+        <p:spPr>
+          <a:xfrm>
+            <a:off x="646111" y="452718"/>
+            <a:ext cx="10182310" cy="1400530"/>
+          </a:xfrm>
+        </p:spPr>
+        <p:txBody>
+          <a:bodyPr/>
+          <a:lstStyle/>
+          <a:p>
+            <a:r>
+              <a:rPr lang="en-US" dirty="0" smtClean="0"/>
+              <a:t>Unit Test Using Dependency Injection</a:t>
+            </a:r>
+            <a:endParaRPr lang="en-US" dirty="0"/>
+          </a:p>
+        </p:txBody>
+      </p:sp>
+      <p:sp>
+        <p:nvSpPr>
+          <p:cNvPr id="3" name="Content Placeholder 2"/>
+          <p:cNvSpPr>
+            <a:spLocks noGrp="1"/>
+          </p:cNvSpPr>
+          <p:nvPr>
+            <p:ph idx="1"/>
+          </p:nvPr>
+        </p:nvSpPr>
+        <p:spPr>
+          <a:xfrm>
+            <a:off x="1103312" y="2052918"/>
+            <a:ext cx="10615446" cy="4195481"/>
+          </a:xfrm>
+        </p:spPr>
+        <p:txBody>
+          <a:bodyPr>
+            <a:normAutofit fontScale="92500" lnSpcReduction="20000"/>
+          </a:bodyPr>
+          <a:lstStyle/>
+          <a:p>
+            <a:pPr marL="0" indent="0">
+              <a:buNone/>
+            </a:pPr>
+            <a:r>
+              <a:rPr lang="en-US" dirty="0" smtClean="0"/>
+              <a:t>	    // </a:t>
+            </a:r>
+            <a:r>
+              <a:rPr lang="en-US" dirty="0"/>
+              <a:t>Arrange</a:t>
+            </a:r>
+          </a:p>
+          <a:p>
+            <a:pPr marL="0" indent="0">
+              <a:buNone/>
+            </a:pPr>
+            <a:r>
+              <a:rPr lang="en-US" dirty="0"/>
+              <a:t>            </a:t>
+            </a:r>
+            <a:r>
+              <a:rPr lang="en-US" dirty="0" err="1"/>
+              <a:t>IFileExtensionManager</a:t>
+            </a:r>
+            <a:r>
+              <a:rPr lang="en-US" dirty="0"/>
+              <a:t> manager = new </a:t>
+            </a:r>
+            <a:r>
+              <a:rPr lang="en-US" dirty="0" err="1"/>
+              <a:t>AlwaysValidFakeExtensionManager</a:t>
+            </a:r>
+            <a:r>
+              <a:rPr lang="en-US" dirty="0"/>
+              <a:t>();</a:t>
+            </a:r>
+          </a:p>
+          <a:p>
+            <a:pPr marL="0" indent="0">
+              <a:buNone/>
+            </a:pPr>
+            <a:r>
+              <a:rPr lang="en-US" dirty="0"/>
+              <a:t>            </a:t>
+            </a:r>
+            <a:r>
+              <a:rPr lang="en-US" dirty="0" err="1"/>
+              <a:t>LoanLogic</a:t>
+            </a:r>
+            <a:r>
+              <a:rPr lang="en-US" dirty="0"/>
+              <a:t> </a:t>
+            </a:r>
+            <a:r>
+              <a:rPr lang="en-US" dirty="0" err="1"/>
+              <a:t>loanLogic</a:t>
+            </a:r>
+            <a:r>
+              <a:rPr lang="en-US" dirty="0"/>
+              <a:t> = new </a:t>
+            </a:r>
+            <a:r>
+              <a:rPr lang="en-US" dirty="0" err="1"/>
+              <a:t>LoanLogic</a:t>
+            </a:r>
+            <a:r>
+              <a:rPr lang="en-US" dirty="0"/>
+              <a:t>(manager</a:t>
+            </a:r>
+            <a:r>
+              <a:rPr lang="en-US" dirty="0" smtClean="0"/>
+              <a:t>);</a:t>
+            </a:r>
+            <a:endParaRPr lang="en-US" dirty="0"/>
+          </a:p>
+          <a:p>
+            <a:pPr marL="0" indent="0">
+              <a:buNone/>
+            </a:pPr>
+            <a:r>
+              <a:rPr lang="en-US" dirty="0"/>
+              <a:t>            string foo =  "</a:t>
+            </a:r>
+            <a:r>
+              <a:rPr lang="en-US" dirty="0" err="1"/>
+              <a:t>kung.foo</a:t>
+            </a:r>
+            <a:r>
+              <a:rPr lang="en-US" dirty="0"/>
+              <a:t>";</a:t>
+            </a:r>
+          </a:p>
+          <a:p>
+            <a:pPr marL="0" indent="0">
+              <a:buNone/>
+            </a:pPr>
+            <a:r>
+              <a:rPr lang="en-US" dirty="0"/>
+              <a:t>            bool result = false;</a:t>
+            </a:r>
+          </a:p>
+          <a:p>
+            <a:pPr marL="0" indent="0">
+              <a:buNone/>
+            </a:pPr>
+            <a:endParaRPr lang="en-US" dirty="0"/>
+          </a:p>
+          <a:p>
+            <a:pPr marL="0" indent="0">
+              <a:buNone/>
+            </a:pPr>
+            <a:r>
+              <a:rPr lang="en-US" dirty="0"/>
+              <a:t>            // Act</a:t>
+            </a:r>
+          </a:p>
+          <a:p>
+            <a:pPr marL="0" indent="0">
+              <a:buNone/>
+            </a:pPr>
+            <a:r>
+              <a:rPr lang="en-US" dirty="0"/>
+              <a:t>            result = </a:t>
+            </a:r>
+            <a:r>
+              <a:rPr lang="en-US" dirty="0" err="1"/>
+              <a:t>loanLogic.IsValidLogFileNameREFACTORED</a:t>
+            </a:r>
+            <a:r>
+              <a:rPr lang="en-US" dirty="0"/>
+              <a:t>(foo);</a:t>
+            </a:r>
+          </a:p>
+          <a:p>
+            <a:pPr marL="0" indent="0">
+              <a:buNone/>
+            </a:pPr>
+            <a:endParaRPr lang="en-US" dirty="0"/>
+          </a:p>
+          <a:p>
+            <a:pPr marL="0" indent="0">
+              <a:buNone/>
+            </a:pPr>
+            <a:r>
+              <a:rPr lang="en-US" dirty="0"/>
+              <a:t>            // Assert</a:t>
+            </a:r>
+          </a:p>
+          <a:p>
+            <a:pPr marL="0" indent="0">
+              <a:buNone/>
+            </a:pPr>
+            <a:r>
+              <a:rPr lang="en-US" dirty="0"/>
+              <a:t>            </a:t>
+            </a:r>
+            <a:r>
+              <a:rPr lang="en-US" dirty="0" err="1"/>
+              <a:t>Assert.IsTrue</a:t>
+            </a:r>
+            <a:r>
+              <a:rPr lang="en-US" dirty="0"/>
+              <a:t>(result);</a:t>
+            </a:r>
+            <a:endParaRPr lang="en-US" dirty="0"/>
+          </a:p>
+        </p:txBody>
+      </p:sp>
+    </p:spTree>
+    <p:extLst>
+      <p:ext uri="{BB962C8B-B14F-4D97-AF65-F5344CB8AC3E}">
+        <p14:creationId xmlns:p14="http://schemas.microsoft.com/office/powerpoint/2010/main" val="3643374265"/>
+      </p:ext>
+    </p:extLst>
+  </p:cSld>
+  <p:clrMapOvr>
+    <a:masterClrMapping/>
+  </p:clrMapOvr>
+</p:sld>
+</file>
+
+<file path=ppt/slides/slide16.xml><?xml version="1.0" encoding="utf-8"?>
+<p:sld xmlns:a="http://schemas.openxmlformats.org/drawingml/2006/main" xmlns:r="http://schemas.openxmlformats.org/officeDocument/2006/relationships" xmlns:p="http://schemas.openxmlformats.org/presentationml/2006/main">
+  <p:cSld>
+    <p:spTree>
+      <p:nvGrpSpPr>
+        <p:cNvPr id="1" name=""/>
+        <p:cNvGrpSpPr/>
+        <p:nvPr/>
+      </p:nvGrpSpPr>
+      <p:grpSpPr>
+        <a:xfrm>
+          <a:off x="0" y="0"/>
+          <a:ext cx="0" cy="0"/>
+          <a:chOff x="0" y="0"/>
+          <a:chExt cx="0" cy="0"/>
+        </a:xfrm>
+      </p:grpSpPr>
+      <p:sp>
+        <p:nvSpPr>
+          <p:cNvPr id="2" name="Title 1"/>
+          <p:cNvSpPr>
+            <a:spLocks noGrp="1"/>
+          </p:cNvSpPr>
+          <p:nvPr>
+            <p:ph type="title"/>
+          </p:nvPr>
+        </p:nvSpPr>
+        <p:spPr/>
+        <p:txBody>
+          <a:bodyPr/>
+          <a:lstStyle/>
+          <a:p>
+            <a:r>
+              <a:rPr lang="en-US" dirty="0" smtClean="0"/>
+              <a:t>Questions</a:t>
+            </a:r>
+            <a:endParaRPr lang="en-US" dirty="0"/>
+          </a:p>
+        </p:txBody>
+      </p:sp>
+      <p:sp>
+        <p:nvSpPr>
+          <p:cNvPr id="3" name="Content Placeholder 2"/>
+          <p:cNvSpPr>
+            <a:spLocks noGrp="1"/>
+          </p:cNvSpPr>
+          <p:nvPr>
+            <p:ph idx="1"/>
+          </p:nvPr>
+        </p:nvSpPr>
+        <p:spPr/>
+        <p:txBody>
+          <a:bodyPr/>
+          <a:lstStyle/>
+          <a:p>
+            <a:pPr marL="0" indent="0" algn="ctr">
+              <a:buNone/>
+            </a:pPr>
+            <a:r>
+              <a:rPr lang="en-US" sz="9600" dirty="0" smtClean="0"/>
+              <a:t>???</a:t>
+            </a:r>
+            <a:endParaRPr lang="en-US" sz="9600" dirty="0"/>
+          </a:p>
+        </p:txBody>
+      </p:sp>
+    </p:spTree>
+    <p:extLst>
+      <p:ext uri="{BB962C8B-B14F-4D97-AF65-F5344CB8AC3E}">
+        <p14:creationId xmlns:p14="http://schemas.microsoft.com/office/powerpoint/2010/main" val="2920812393"/>
+      </p:ext>
+    </p:extLst>
+  </p:cSld>
+  <p:clrMapOvr>
+    <a:masterClrMapping/>
+  </p:clrMapOvr>
+</p:sld>
+</file>
+
 <file path=ppt/slides/slide2.xml><?xml version="1.0" encoding="utf-8"?>
 <p:sld xmlns:a="http://schemas.openxmlformats.org/drawingml/2006/main" xmlns:r="http://schemas.openxmlformats.org/officeDocument/2006/relationships" xmlns:p="http://schemas.openxmlformats.org/presentationml/2006/main">
   <p:cSld>
@@ -6286,7 +7365,7 @@
           <a:p>
             <a:r>
               <a:rPr lang="en-US" dirty="0" smtClean="0"/>
-              <a:t>Properties of a Good Unit Test	</a:t>
+              <a:t>Unit Testing Frameworks</a:t>
             </a:r>
             <a:endParaRPr lang="en-US" dirty="0"/>
           </a:p>
@@ -6308,58 +7387,71 @@
           <a:lstStyle/>
           <a:p>
             <a:r>
+              <a:rPr lang="en-US" dirty="0" err="1" smtClean="0"/>
+              <a:t>Nunit</a:t>
+            </a:r>
+            <a:r>
               <a:rPr lang="en-US" dirty="0" smtClean="0"/>
-              <a:t>Should be automated and repeatable</a:t>
-            </a:r>
-          </a:p>
-          <a:p>
+              <a:t> (</a:t>
+            </a:r>
+            <a:r>
+              <a:rPr lang="en-US" dirty="0" err="1" smtClean="0"/>
+              <a:t>xUnit</a:t>
+            </a:r>
             <a:r>
               <a:rPr lang="en-US" dirty="0" smtClean="0"/>
-              <a:t>Should be easy to implement</a:t>
-            </a:r>
+              <a:t>)</a:t>
+            </a:r>
+            <a:endParaRPr lang="en-US" dirty="0" smtClean="0"/>
           </a:p>
           <a:p>
             <a:r>
               <a:rPr lang="en-US" dirty="0" smtClean="0"/>
-              <a:t>Should always be relevant</a:t>
-            </a:r>
-          </a:p>
-          <a:p>
+              <a:t>Microsoft </a:t>
+            </a:r>
+            <a:r>
+              <a:rPr lang="en-US" dirty="0" err="1" smtClean="0"/>
+              <a:t>UnitTesting</a:t>
+            </a:r>
             <a:r>
               <a:rPr lang="en-US" dirty="0" smtClean="0"/>
-              <a:t>Should be easy to run and evaluate</a:t>
-            </a:r>
-          </a:p>
-          <a:p>
+              <a:t> </a:t>
+            </a:r>
             <a:r>
               <a:rPr lang="en-US" dirty="0" smtClean="0"/>
-              <a:t>Should be consistent</a:t>
-            </a:r>
+              <a:t>Tools</a:t>
+            </a:r>
+          </a:p>
+          <a:p>
+            <a:r>
+              <a:rPr lang="en-US" dirty="0" err="1" smtClean="0"/>
+              <a:t>Fluint</a:t>
+            </a:r>
+            <a:endParaRPr lang="en-US" dirty="0" smtClean="0"/>
+          </a:p>
+          <a:p>
+            <a:r>
+              <a:rPr lang="en-US" dirty="0" err="1" smtClean="0"/>
+              <a:t>Moq</a:t>
+            </a:r>
+            <a:endParaRPr lang="en-US" dirty="0" smtClean="0"/>
           </a:p>
           <a:p>
             <a:r>
               <a:rPr lang="en-US" dirty="0" smtClean="0"/>
-              <a:t>Should have full control of unit under test</a:t>
-            </a:r>
-          </a:p>
-          <a:p>
-            <a:r>
-              <a:rPr lang="en-US" dirty="0" smtClean="0"/>
-              <a:t>Should be isolated</a:t>
-            </a:r>
-          </a:p>
-          <a:p>
-            <a:r>
-              <a:rPr lang="en-US" dirty="0" smtClean="0"/>
-              <a:t>Failure should indicate what failed</a:t>
-            </a:r>
+              <a:t>Many others</a:t>
+            </a:r>
+            <a:endParaRPr lang="en-US" dirty="0" smtClean="0"/>
+          </a:p>
+          <a:p>
+            <a:endParaRPr lang="en-US" dirty="0"/>
           </a:p>
         </p:txBody>
       </p:sp>
     </p:spTree>
     <p:extLst>
       <p:ext uri="{BB962C8B-B14F-4D97-AF65-F5344CB8AC3E}">
-        <p14:creationId xmlns:p14="http://schemas.microsoft.com/office/powerpoint/2010/main" val="1748675493"/>
+        <p14:creationId xmlns:p14="http://schemas.microsoft.com/office/powerpoint/2010/main" val="3712302346"/>
       </p:ext>
     </p:extLst>
   </p:cSld>
@@ -6403,7 +7495,7 @@
           <a:p>
             <a:r>
               <a:rPr lang="en-US" dirty="0" smtClean="0"/>
-              <a:t>Unit Testing Frameworks</a:t>
+              <a:t>Properties of a Good Unit Test	</a:t>
             </a:r>
             <a:endParaRPr lang="en-US" dirty="0"/>
           </a:p>
@@ -6425,41 +7517,58 @@
           <a:lstStyle/>
           <a:p>
             <a:r>
-              <a:rPr lang="en-US" dirty="0" err="1" smtClean="0"/>
-              <a:t>Nunit</a:t>
-            </a:r>
-            <a:endParaRPr lang="en-US" dirty="0" smtClean="0"/>
-          </a:p>
-          <a:p>
-            <a:r>
               <a:rPr lang="en-US" dirty="0" smtClean="0"/>
-              <a:t>Microsoft </a:t>
-            </a:r>
-            <a:r>
-              <a:rPr lang="en-US" dirty="0" err="1" smtClean="0"/>
-              <a:t>UnitTesting</a:t>
-            </a:r>
+              <a:t>Should be automated and repeatable</a:t>
+            </a:r>
+          </a:p>
+          <a:p>
             <a:r>
               <a:rPr lang="en-US" dirty="0" smtClean="0"/>
-              <a:t> Tools</a:t>
-            </a:r>
-          </a:p>
-          <a:p>
-            <a:r>
-              <a:rPr lang="en-US" dirty="0" err="1" smtClean="0"/>
-              <a:t>Moq</a:t>
-            </a:r>
-            <a:endParaRPr lang="en-US" dirty="0" smtClean="0"/>
-          </a:p>
-          <a:p>
-            <a:endParaRPr lang="en-US" dirty="0"/>
+              <a:t>Should be easy to implement</a:t>
+            </a:r>
+          </a:p>
+          <a:p>
+            <a:r>
+              <a:rPr lang="en-US" dirty="0" smtClean="0"/>
+              <a:t>Should always be relevant</a:t>
+            </a:r>
+          </a:p>
+          <a:p>
+            <a:r>
+              <a:rPr lang="en-US" dirty="0" smtClean="0"/>
+              <a:t>Should be easy to run and evaluate</a:t>
+            </a:r>
+          </a:p>
+          <a:p>
+            <a:r>
+              <a:rPr lang="en-US" dirty="0" smtClean="0"/>
+              <a:t>Should be consistent</a:t>
+            </a:r>
+          </a:p>
+          <a:p>
+            <a:r>
+              <a:rPr lang="en-US" dirty="0" smtClean="0"/>
+              <a:t>Should have full control of unit under test</a:t>
+            </a:r>
+          </a:p>
+          <a:p>
+            <a:r>
+              <a:rPr lang="en-US" dirty="0" smtClean="0"/>
+              <a:t>Should be isolated</a:t>
+            </a:r>
+          </a:p>
+          <a:p>
+            <a:r>
+              <a:rPr lang="en-US" dirty="0" smtClean="0"/>
+              <a:t>Failure should indicate what failed</a:t>
+            </a:r>
           </a:p>
         </p:txBody>
       </p:sp>
     </p:spTree>
     <p:extLst>
       <p:ext uri="{BB962C8B-B14F-4D97-AF65-F5344CB8AC3E}">
-        <p14:creationId xmlns:p14="http://schemas.microsoft.com/office/powerpoint/2010/main" val="3712302346"/>
+        <p14:creationId xmlns:p14="http://schemas.microsoft.com/office/powerpoint/2010/main" val="1748675493"/>
       </p:ext>
     </p:extLst>
   </p:cSld>
@@ -6566,8 +7675,17 @@
             <a:pPr lvl="1"/>
             <a:r>
               <a:rPr lang="en-US" dirty="0" smtClean="0"/>
-              <a:t>Design Unit Tests around existing code</a:t>
-            </a:r>
+              <a:t>Design Unit Tests around existing </a:t>
+            </a:r>
+            <a:r>
+              <a:rPr lang="en-US" dirty="0" smtClean="0"/>
+              <a:t>code, refactoring </a:t>
+            </a:r>
+            <a:r>
+              <a:rPr lang="en-US" smtClean="0"/>
+              <a:t>where necessary</a:t>
+            </a:r>
+            <a:endParaRPr lang="en-US" dirty="0" smtClean="0"/>
           </a:p>
         </p:txBody>
       </p:sp>
@@ -6653,13 +7771,70 @@
           <a:p>
             <a:r>
               <a:rPr lang="en-US" dirty="0" smtClean="0"/>
-              <a:t>Use long, descriptive names for test methods</a:t>
-            </a:r>
-          </a:p>
-          <a:p>
-            <a:r>
-              <a:rPr lang="en-US" dirty="0"/>
-              <a:t>Other Windows – Test Explorer</a:t>
+              <a:t>Use long, descriptive names for test </a:t>
+            </a:r>
+            <a:r>
+              <a:rPr lang="en-US" dirty="0" smtClean="0"/>
+              <a:t>methods, </a:t>
+            </a:r>
+            <a:r>
+              <a:rPr lang="en-US" dirty="0" err="1"/>
+              <a:t>Osherove</a:t>
+            </a:r>
+            <a:r>
+              <a:rPr lang="en-US" dirty="0"/>
+              <a:t> </a:t>
+            </a:r>
+            <a:r>
+              <a:rPr lang="en-US" dirty="0" smtClean="0"/>
+              <a:t> suggests:</a:t>
+            </a:r>
+            <a:endParaRPr lang="en-US" dirty="0" smtClean="0"/>
+          </a:p>
+          <a:p>
+            <a:pPr lvl="1"/>
+            <a:r>
+              <a:rPr lang="en-US" dirty="0" smtClean="0"/>
+              <a:t>[</a:t>
+            </a:r>
+            <a:r>
+              <a:rPr lang="en-US" dirty="0" err="1" smtClean="0"/>
+              <a:t>UnitOfWorkName</a:t>
+            </a:r>
+            <a:r>
+              <a:rPr lang="en-US" dirty="0" smtClean="0"/>
+              <a:t>]_[</a:t>
+            </a:r>
+            <a:r>
+              <a:rPr lang="en-US" dirty="0" err="1" smtClean="0"/>
+              <a:t>ScenarioUnderTest</a:t>
+            </a:r>
+            <a:r>
+              <a:rPr lang="en-US" dirty="0" smtClean="0"/>
+              <a:t>]_[</a:t>
+            </a:r>
+            <a:r>
+              <a:rPr lang="en-US" dirty="0" err="1" smtClean="0"/>
+              <a:t>ExpectedBehavior</a:t>
+            </a:r>
+            <a:r>
+              <a:rPr lang="en-US" dirty="0" smtClean="0"/>
+              <a:t>]</a:t>
+            </a:r>
+            <a:endParaRPr lang="en-US" dirty="0" smtClean="0"/>
+          </a:p>
+          <a:p>
+            <a:r>
+              <a:rPr lang="en-US" dirty="0" smtClean="0"/>
+              <a:t>Other Windows – </a:t>
+            </a:r>
+            <a:r>
+              <a:rPr lang="en-US" dirty="0"/>
+              <a:t>Test </a:t>
+            </a:r>
+            <a:r>
+              <a:rPr lang="en-US" dirty="0" smtClean="0"/>
+              <a:t>Explorer</a:t>
             </a:r>
           </a:p>
           <a:p>
@@ -7036,7 +8211,6 @@
               <a:rPr lang="en-US" dirty="0"/>
               <a:t>        }</a:t>
             </a:r>
-            <a:endParaRPr lang="en-US" dirty="0"/>
           </a:p>
         </p:txBody>
       </p:sp>
@@ -7364,7 +8538,6 @@
               <a:rPr lang="en-US" dirty="0"/>
               <a:t>;</a:t>
             </a:r>
-            <a:endParaRPr lang="en-US" dirty="0"/>
           </a:p>
         </p:txBody>
       </p:sp>

</xml_diff>

<commit_message>
Final changes to the presentation.
</commit_message>
<xml_diff>
--- a/UnitTestPresentation.pptx
+++ b/UnitTestPresentation.pptx
@@ -11,16 +11,17 @@
     <p:sldId id="260" r:id="rId5"/>
     <p:sldId id="261" r:id="rId6"/>
     <p:sldId id="258" r:id="rId7"/>
-    <p:sldId id="262" r:id="rId8"/>
-    <p:sldId id="263" r:id="rId9"/>
-    <p:sldId id="264" r:id="rId10"/>
-    <p:sldId id="265" r:id="rId11"/>
-    <p:sldId id="266" r:id="rId12"/>
-    <p:sldId id="267" r:id="rId13"/>
-    <p:sldId id="268" r:id="rId14"/>
-    <p:sldId id="269" r:id="rId15"/>
-    <p:sldId id="271" r:id="rId16"/>
-    <p:sldId id="270" r:id="rId17"/>
+    <p:sldId id="272" r:id="rId8"/>
+    <p:sldId id="262" r:id="rId9"/>
+    <p:sldId id="263" r:id="rId10"/>
+    <p:sldId id="264" r:id="rId11"/>
+    <p:sldId id="265" r:id="rId12"/>
+    <p:sldId id="266" r:id="rId13"/>
+    <p:sldId id="267" r:id="rId14"/>
+    <p:sldId id="268" r:id="rId15"/>
+    <p:sldId id="269" r:id="rId16"/>
+    <p:sldId id="271" r:id="rId17"/>
+    <p:sldId id="270" r:id="rId18"/>
   </p:sldIdLst>
   <p:sldSz cx="12192000" cy="6858000"/>
   <p:notesSz cx="6858000" cy="9144000"/>
@@ -6162,6 +6163,13 @@
   <p:clrMapOvr>
     <a:masterClrMapping/>
   </p:clrMapOvr>
+  <p:timing>
+    <p:tnLst>
+      <p:par>
+        <p:cTn id="1" dur="indefinite" restart="never" nodeType="tmRoot"/>
+      </p:par>
+    </p:tnLst>
+  </p:timing>
 </p:sld>
 </file>
 
@@ -6199,7 +6207,7 @@
           <a:p>
             <a:r>
               <a:rPr lang="en-US" dirty="0" smtClean="0"/>
-              <a:t>Dependency Injection</a:t>
+              <a:t>Data Example</a:t>
             </a:r>
             <a:endParaRPr lang="en-US" dirty="0"/>
           </a:p>
@@ -6215,50 +6223,287 @@
             <p:ph idx="1"/>
           </p:nvPr>
         </p:nvSpPr>
-        <p:spPr/>
-        <p:txBody>
-          <a:bodyPr/>
-          <a:lstStyle/>
-          <a:p>
+        <p:spPr>
+          <a:xfrm>
+            <a:off x="252664" y="1082842"/>
+            <a:ext cx="11754852" cy="5390147"/>
+          </a:xfrm>
+        </p:spPr>
+        <p:txBody>
+          <a:bodyPr>
+            <a:normAutofit lnSpcReduction="10000"/>
+          </a:bodyPr>
+          <a:lstStyle/>
+          <a:p>
+            <a:pPr marL="0" indent="0">
+              <a:buNone/>
+            </a:pPr>
             <a:r>
               <a:rPr lang="en-US" dirty="0" smtClean="0"/>
-              <a:t>Using Constructor Injection</a:t>
-            </a:r>
-          </a:p>
-          <a:p>
+              <a:t>		// </a:t>
+            </a:r>
+            <a:r>
+              <a:rPr lang="en-US" dirty="0"/>
+              <a:t>Arrange</a:t>
+            </a:r>
+          </a:p>
+          <a:p>
+            <a:pPr marL="0" indent="0">
+              <a:buNone/>
+            </a:pPr>
+            <a:r>
+              <a:rPr lang="en-US" dirty="0"/>
+              <a:t>            Repository repo = new Repository();</a:t>
+            </a:r>
+          </a:p>
+          <a:p>
+            <a:pPr marL="0" indent="0">
+              <a:buNone/>
+            </a:pPr>
+            <a:r>
+              <a:rPr lang="en-US" dirty="0"/>
+              <a:t>            </a:t>
+            </a:r>
+            <a:r>
+              <a:rPr lang="en-US" dirty="0" err="1"/>
+              <a:t>var</a:t>
+            </a:r>
+            <a:r>
+              <a:rPr lang="en-US" dirty="0"/>
+              <a:t> </a:t>
+            </a:r>
+            <a:r>
+              <a:rPr lang="en-US" dirty="0" err="1"/>
+              <a:t>mockRepository</a:t>
+            </a:r>
+            <a:r>
+              <a:rPr lang="en-US" dirty="0"/>
+              <a:t> = new Mock&lt;</a:t>
+            </a:r>
+            <a:r>
+              <a:rPr lang="en-US" dirty="0" err="1"/>
+              <a:t>ILoanModelDAL</a:t>
+            </a:r>
             <a:r>
               <a:rPr lang="en-US" dirty="0" smtClean="0"/>
-              <a:t>Using Property Injection (most commonly called Dependency Injection, although all items technically are)</a:t>
-            </a:r>
-          </a:p>
-          <a:p>
+              <a:t>&gt;();</a:t>
+            </a:r>
+          </a:p>
+          <a:p>
+            <a:pPr marL="0" indent="0">
+              <a:buNone/>
+            </a:pPr>
             <a:r>
               <a:rPr lang="en-US" dirty="0" smtClean="0"/>
-              <a:t>Using a factory class</a:t>
-            </a:r>
-          </a:p>
-          <a:p>
+              <a:t>		</a:t>
+            </a:r>
+            <a:r>
+              <a:rPr lang="en-US" dirty="0" err="1" smtClean="0"/>
+              <a:t>LoanModel</a:t>
+            </a:r>
+            <a:r>
+              <a:rPr lang="en-US" dirty="0" smtClean="0"/>
+              <a:t> </a:t>
+            </a:r>
+            <a:r>
+              <a:rPr lang="en-US" dirty="0"/>
+              <a:t>loan = new </a:t>
+            </a:r>
+            <a:r>
+              <a:rPr lang="en-US" dirty="0" err="1"/>
+              <a:t>LoanModel</a:t>
+            </a:r>
+            <a:r>
+              <a:rPr lang="en-US" dirty="0" smtClean="0"/>
+              <a:t>();</a:t>
+            </a:r>
+          </a:p>
+          <a:p>
+            <a:pPr marL="0" indent="0">
+              <a:buNone/>
+            </a:pPr>
+            <a:r>
+              <a:rPr lang="en-US" dirty="0" smtClean="0"/>
+              <a:t>             </a:t>
+            </a:r>
+            <a:r>
+              <a:rPr lang="en-US" dirty="0" err="1" smtClean="0"/>
+              <a:t>loan.LoanID</a:t>
+            </a:r>
+            <a:r>
+              <a:rPr lang="en-US" dirty="0" smtClean="0"/>
+              <a:t> </a:t>
+            </a:r>
+            <a:r>
+              <a:rPr lang="en-US" dirty="0"/>
+              <a:t>= 1;</a:t>
+            </a:r>
+          </a:p>
+          <a:p>
+            <a:pPr marL="0" indent="0">
+              <a:buNone/>
+            </a:pPr>
+            <a:r>
+              <a:rPr lang="en-US" dirty="0"/>
+              <a:t>        </a:t>
+            </a:r>
+            <a:r>
+              <a:rPr lang="en-US" dirty="0" smtClean="0"/>
+              <a:t>	</a:t>
+            </a:r>
+            <a:r>
+              <a:rPr lang="en-US" dirty="0" err="1" smtClean="0"/>
+              <a:t>loan.Amount</a:t>
+            </a:r>
+            <a:r>
+              <a:rPr lang="en-US" dirty="0" smtClean="0"/>
+              <a:t> </a:t>
+            </a:r>
+            <a:r>
+              <a:rPr lang="en-US" dirty="0"/>
+              <a:t>= 100;</a:t>
+            </a:r>
+          </a:p>
+          <a:p>
+            <a:pPr marL="0" indent="0">
+              <a:buNone/>
+            </a:pPr>
+            <a:endParaRPr lang="en-US" dirty="0" smtClean="0"/>
+          </a:p>
+          <a:p>
+            <a:pPr marL="0" indent="0">
+              <a:buNone/>
+            </a:pPr>
+            <a:r>
+              <a:rPr lang="en-US" dirty="0" smtClean="0"/>
+              <a:t>            </a:t>
+            </a:r>
+            <a:r>
+              <a:rPr lang="en-US" dirty="0"/>
+              <a:t>// tell the mock that when </a:t>
+            </a:r>
+            <a:r>
+              <a:rPr lang="en-US" dirty="0" err="1"/>
+              <a:t>LoanSelectByID</a:t>
+            </a:r>
+            <a:r>
+              <a:rPr lang="en-US" dirty="0"/>
+              <a:t> is </a:t>
+            </a:r>
+            <a:r>
+              <a:rPr lang="en-US" dirty="0" smtClean="0"/>
+              <a:t>called </a:t>
+            </a:r>
+            <a:r>
+              <a:rPr lang="en-US" dirty="0"/>
+              <a:t>return the specified Loan</a:t>
+            </a:r>
+          </a:p>
+          <a:p>
+            <a:pPr marL="0" indent="0">
+              <a:buNone/>
+            </a:pPr>
+            <a:r>
+              <a:rPr lang="en-US" dirty="0"/>
+              <a:t>            </a:t>
+            </a:r>
+            <a:r>
+              <a:rPr lang="en-US" dirty="0" err="1"/>
+              <a:t>mockRepository.Setup</a:t>
+            </a:r>
+            <a:r>
+              <a:rPr lang="en-US" dirty="0"/>
+              <a:t>(</a:t>
+            </a:r>
+            <a:r>
+              <a:rPr lang="en-US" dirty="0" err="1"/>
+              <a:t>cr</a:t>
+            </a:r>
+            <a:r>
+              <a:rPr lang="en-US" dirty="0"/>
+              <a:t> =&gt; </a:t>
+            </a:r>
+            <a:r>
+              <a:rPr lang="en-US" dirty="0" err="1"/>
+              <a:t>cr.LoanSelectByID</a:t>
+            </a:r>
+            <a:r>
+              <a:rPr lang="en-US" dirty="0"/>
+              <a:t>(id)).Returns(loan</a:t>
+            </a:r>
+            <a:r>
+              <a:rPr lang="en-US" dirty="0" smtClean="0"/>
+              <a:t>);</a:t>
+            </a:r>
+          </a:p>
+          <a:p>
+            <a:pPr marL="0" indent="0">
+              <a:buNone/>
+            </a:pPr>
             <a:endParaRPr lang="en-US" dirty="0"/>
           </a:p>
           <a:p>
-            <a:r>
-              <a:rPr lang="en-US" dirty="0" smtClean="0"/>
-              <a:t>We will cover Constructor Injection</a:t>
-            </a:r>
-            <a:endParaRPr lang="en-US" dirty="0"/>
+            <a:pPr marL="0" indent="0">
+              <a:buNone/>
+            </a:pPr>
+            <a:r>
+              <a:rPr lang="en-US" dirty="0"/>
+              <a:t>            // pass the mocked instance, not the mock itself, to the category</a:t>
+            </a:r>
+          </a:p>
+          <a:p>
+            <a:pPr marL="0" indent="0">
+              <a:buNone/>
+            </a:pPr>
+            <a:r>
+              <a:rPr lang="en-US" dirty="0"/>
+              <a:t>            // controller using the Object property</a:t>
+            </a:r>
+          </a:p>
+          <a:p>
+            <a:pPr marL="0" indent="0">
+              <a:buNone/>
+            </a:pPr>
+            <a:r>
+              <a:rPr lang="en-US" dirty="0"/>
+              <a:t>            </a:t>
+            </a:r>
+            <a:r>
+              <a:rPr lang="en-US" dirty="0" err="1"/>
+              <a:t>repo.iLoanModelDAL</a:t>
+            </a:r>
+            <a:r>
+              <a:rPr lang="en-US" dirty="0"/>
+              <a:t> = </a:t>
+            </a:r>
+            <a:r>
+              <a:rPr lang="en-US" dirty="0" err="1"/>
+              <a:t>mockRepository.Object</a:t>
+            </a:r>
+            <a:r>
+              <a:rPr lang="en-US" dirty="0"/>
+              <a:t>;</a:t>
+            </a:r>
           </a:p>
         </p:txBody>
       </p:sp>
     </p:spTree>
     <p:extLst>
       <p:ext uri="{BB962C8B-B14F-4D97-AF65-F5344CB8AC3E}">
-        <p14:creationId xmlns:p14="http://schemas.microsoft.com/office/powerpoint/2010/main" val="1045386513"/>
+        <p14:creationId xmlns:p14="http://schemas.microsoft.com/office/powerpoint/2010/main" val="2068941965"/>
       </p:ext>
     </p:extLst>
   </p:cSld>
   <p:clrMapOvr>
     <a:masterClrMapping/>
   </p:clrMapOvr>
+  <p:timing>
+    <p:tnLst>
+      <p:par>
+        <p:cTn id="1" dur="indefinite" restart="never" nodeType="tmRoot"/>
+      </p:par>
+    </p:tnLst>
+  </p:timing>
 </p:sld>
 </file>
 
@@ -6296,7 +6541,7 @@
           <a:p>
             <a:r>
               <a:rPr lang="en-US" dirty="0" smtClean="0"/>
-              <a:t>Constructor Injection</a:t>
+              <a:t>Dependency Injection</a:t>
             </a:r>
             <a:endParaRPr lang="en-US" dirty="0"/>
           </a:p>
@@ -6319,16 +6564,29 @@
           <a:p>
             <a:r>
               <a:rPr lang="en-US" dirty="0" smtClean="0"/>
-              <a:t>Easiest, most readable</a:t>
+              <a:t>Using Constructor Injection</a:t>
             </a:r>
           </a:p>
           <a:p>
             <a:r>
               <a:rPr lang="en-US" dirty="0" smtClean="0"/>
-              <a:t>Can get complicated and hard to maintain if the code under tests uses a lot of constructors</a:t>
-            </a:r>
-          </a:p>
-          <a:p>
+              <a:t>Using Property Injection (most commonly called Dependency Injection, although all items technically are)</a:t>
+            </a:r>
+          </a:p>
+          <a:p>
+            <a:r>
+              <a:rPr lang="en-US" dirty="0" smtClean="0"/>
+              <a:t>Using a factory class</a:t>
+            </a:r>
+          </a:p>
+          <a:p>
+            <a:endParaRPr lang="en-US" dirty="0"/>
+          </a:p>
+          <a:p>
+            <a:r>
+              <a:rPr lang="en-US" dirty="0" smtClean="0"/>
+              <a:t>We will cover Constructor Injection</a:t>
+            </a:r>
             <a:endParaRPr lang="en-US" dirty="0"/>
           </a:p>
         </p:txBody>
@@ -6336,13 +6594,20 @@
     </p:spTree>
     <p:extLst>
       <p:ext uri="{BB962C8B-B14F-4D97-AF65-F5344CB8AC3E}">
-        <p14:creationId xmlns:p14="http://schemas.microsoft.com/office/powerpoint/2010/main" val="1663355157"/>
+        <p14:creationId xmlns:p14="http://schemas.microsoft.com/office/powerpoint/2010/main" val="1045386513"/>
       </p:ext>
     </p:extLst>
   </p:cSld>
   <p:clrMapOvr>
     <a:masterClrMapping/>
   </p:clrMapOvr>
+  <p:timing>
+    <p:tnLst>
+      <p:par>
+        <p:cTn id="1" dur="indefinite" restart="never" nodeType="tmRoot"/>
+      </p:par>
+    </p:tnLst>
+  </p:timing>
 </p:sld>
 </file>
 
@@ -6380,7 +6645,7 @@
           <a:p>
             <a:r>
               <a:rPr lang="en-US" dirty="0" smtClean="0"/>
-              <a:t>Original Code</a:t>
+              <a:t>Constructor Injection</a:t>
             </a:r>
             <a:endParaRPr lang="en-US" dirty="0"/>
           </a:p>
@@ -6401,100 +6666,18 @@
           <a:bodyPr/>
           <a:lstStyle/>
           <a:p>
-            <a:pPr marL="0" indent="0">
-              <a:buNone/>
-            </a:pPr>
-            <a:r>
-              <a:rPr lang="en-US" dirty="0"/>
-              <a:t>public bool </a:t>
-            </a:r>
-            <a:r>
-              <a:rPr lang="en-US" dirty="0" err="1"/>
-              <a:t>IsValidLogFileName</a:t>
-            </a:r>
-            <a:r>
-              <a:rPr lang="en-US" dirty="0"/>
-              <a:t>(string </a:t>
-            </a:r>
-            <a:r>
-              <a:rPr lang="en-US" dirty="0" err="1"/>
-              <a:t>fileName</a:t>
-            </a:r>
-            <a:r>
-              <a:rPr lang="en-US" dirty="0"/>
-              <a:t>)</a:t>
-            </a:r>
-          </a:p>
-          <a:p>
-            <a:pPr marL="0" indent="0">
-              <a:buNone/>
-            </a:pPr>
-            <a:r>
-              <a:rPr lang="en-US" dirty="0"/>
-              <a:t>        {</a:t>
-            </a:r>
-          </a:p>
-          <a:p>
-            <a:pPr marL="0" indent="0">
-              <a:buNone/>
-            </a:pPr>
-            <a:r>
-              <a:rPr lang="en-US" dirty="0"/>
-              <a:t>            if (</a:t>
-            </a:r>
-            <a:r>
-              <a:rPr lang="en-US" dirty="0" err="1"/>
-              <a:t>fileName.EndsWith</a:t>
-            </a:r>
-            <a:r>
-              <a:rPr lang="en-US" dirty="0"/>
-              <a:t>(".foo"))</a:t>
-            </a:r>
-          </a:p>
-          <a:p>
-            <a:pPr marL="0" indent="0">
-              <a:buNone/>
-            </a:pPr>
-            <a:r>
-              <a:rPr lang="en-US" dirty="0"/>
-              <a:t>            {</a:t>
-            </a:r>
-          </a:p>
-          <a:p>
-            <a:pPr marL="0" indent="0">
-              <a:buNone/>
-            </a:pPr>
-            <a:r>
-              <a:rPr lang="en-US" dirty="0"/>
-              <a:t>                return false;</a:t>
-            </a:r>
-          </a:p>
-          <a:p>
-            <a:pPr marL="0" indent="0">
-              <a:buNone/>
-            </a:pPr>
-            <a:r>
-              <a:rPr lang="en-US" dirty="0"/>
-              <a:t>            }</a:t>
-            </a:r>
-          </a:p>
-          <a:p>
-            <a:pPr marL="0" indent="0">
-              <a:buNone/>
-            </a:pPr>
-            <a:r>
-              <a:rPr lang="en-US" dirty="0"/>
-              <a:t>            return true;</a:t>
-            </a:r>
-          </a:p>
-          <a:p>
-            <a:pPr marL="0" indent="0">
-              <a:buNone/>
-            </a:pPr>
-            <a:r>
-              <a:rPr lang="en-US" dirty="0"/>
-              <a:t>        }</a:t>
-            </a:r>
+            <a:r>
+              <a:rPr lang="en-US" dirty="0" smtClean="0"/>
+              <a:t>Easiest, most readable</a:t>
+            </a:r>
+          </a:p>
+          <a:p>
+            <a:r>
+              <a:rPr lang="en-US" dirty="0" smtClean="0"/>
+              <a:t>Can get complicated and hard to maintain if the code under tests uses a lot of constructors</a:t>
+            </a:r>
+          </a:p>
+          <a:p>
             <a:endParaRPr lang="en-US" dirty="0"/>
           </a:p>
         </p:txBody>
@@ -6502,13 +6685,20 @@
     </p:spTree>
     <p:extLst>
       <p:ext uri="{BB962C8B-B14F-4D97-AF65-F5344CB8AC3E}">
-        <p14:creationId xmlns:p14="http://schemas.microsoft.com/office/powerpoint/2010/main" val="3509692673"/>
+        <p14:creationId xmlns:p14="http://schemas.microsoft.com/office/powerpoint/2010/main" val="1663355157"/>
       </p:ext>
     </p:extLst>
   </p:cSld>
   <p:clrMapOvr>
     <a:masterClrMapping/>
   </p:clrMapOvr>
+  <p:timing>
+    <p:tnLst>
+      <p:par>
+        <p:cTn id="1" dur="indefinite" restart="never" nodeType="tmRoot"/>
+      </p:par>
+    </p:tnLst>
+  </p:timing>
 </p:sld>
 </file>
 
@@ -6546,7 +6736,7 @@
           <a:p>
             <a:r>
               <a:rPr lang="en-US" dirty="0" smtClean="0"/>
-              <a:t>Refactored</a:t>
+              <a:t>Original Code</a:t>
             </a:r>
             <a:endParaRPr lang="en-US" dirty="0"/>
           </a:p>
@@ -6562,16 +6752,9 @@
             <p:ph idx="1"/>
           </p:nvPr>
         </p:nvSpPr>
-        <p:spPr>
-          <a:xfrm>
-            <a:off x="1103312" y="1528012"/>
-            <a:ext cx="8946541" cy="4720388"/>
-          </a:xfrm>
-        </p:spPr>
-        <p:txBody>
-          <a:bodyPr>
-            <a:normAutofit/>
-          </a:bodyPr>
+        <p:spPr/>
+        <p:txBody>
+          <a:bodyPr/>
           <a:lstStyle/>
           <a:p>
             <a:pPr marL="0" indent="0">
@@ -6579,47 +6762,11 @@
             </a:pPr>
             <a:r>
               <a:rPr lang="en-US" dirty="0"/>
-              <a:t>public class </a:t>
+              <a:t>public bool </a:t>
             </a:r>
             <a:r>
               <a:rPr lang="en-US" dirty="0" err="1"/>
-              <a:t>FileExtensionManager</a:t>
-            </a:r>
-            <a:r>
-              <a:rPr lang="en-US" dirty="0"/>
-              <a:t> : </a:t>
-            </a:r>
-            <a:r>
-              <a:rPr lang="en-US" dirty="0" err="1"/>
-              <a:t>IFileExtensionManager</a:t>
-            </a:r>
-            <a:endParaRPr lang="en-US" dirty="0"/>
-          </a:p>
-          <a:p>
-            <a:pPr marL="0" indent="0">
-              <a:buNone/>
-            </a:pPr>
-            <a:r>
-              <a:rPr lang="en-US" dirty="0"/>
-              <a:t>    </a:t>
-            </a:r>
-            <a:r>
-              <a:rPr lang="en-US" dirty="0" smtClean="0"/>
-              <a:t>{</a:t>
-            </a:r>
-            <a:endParaRPr lang="en-US" dirty="0"/>
-          </a:p>
-          <a:p>
-            <a:pPr marL="0" indent="0">
-              <a:buNone/>
-            </a:pPr>
-            <a:r>
-              <a:rPr lang="en-US" dirty="0"/>
-              <a:t>        public bool </a:t>
-            </a:r>
-            <a:r>
-              <a:rPr lang="en-US" dirty="0" err="1"/>
-              <a:t>IsValid</a:t>
+              <a:t>IsValidLogFileName</a:t>
             </a:r>
             <a:r>
               <a:rPr lang="en-US" dirty="0"/>
@@ -6648,12 +6795,8 @@
               <a:buNone/>
             </a:pPr>
             <a:r>
-              <a:rPr lang="en-US" dirty="0" smtClean="0"/>
-              <a:t>		   if </a:t>
-            </a:r>
-            <a:r>
-              <a:rPr lang="en-US" dirty="0"/>
-              <a:t>(</a:t>
+              <a:rPr lang="en-US" dirty="0"/>
+              <a:t>            if (</a:t>
             </a:r>
             <a:r>
               <a:rPr lang="en-US" dirty="0" err="1"/>
@@ -6708,29 +6851,26 @@
               <a:rPr lang="en-US" dirty="0"/>
               <a:t>        }</a:t>
             </a:r>
-          </a:p>
-          <a:p>
-            <a:pPr marL="0" indent="0">
-              <a:buNone/>
-            </a:pPr>
-            <a:r>
-              <a:rPr lang="en-US" dirty="0"/>
-              <a:t>    }</a:t>
-            </a:r>
-            <a:endParaRPr lang="en-US" dirty="0"/>
           </a:p>
         </p:txBody>
       </p:sp>
     </p:spTree>
     <p:extLst>
       <p:ext uri="{BB962C8B-B14F-4D97-AF65-F5344CB8AC3E}">
-        <p14:creationId xmlns:p14="http://schemas.microsoft.com/office/powerpoint/2010/main" val="3015367097"/>
+        <p14:creationId xmlns:p14="http://schemas.microsoft.com/office/powerpoint/2010/main" val="3509692673"/>
       </p:ext>
     </p:extLst>
   </p:cSld>
   <p:clrMapOvr>
     <a:masterClrMapping/>
   </p:clrMapOvr>
+  <p:timing>
+    <p:tnLst>
+      <p:par>
+        <p:cTn id="1" dur="indefinite" restart="never" nodeType="tmRoot"/>
+      </p:par>
+    </p:tnLst>
+  </p:timing>
 </p:sld>
 </file>
 
@@ -6768,7 +6908,7 @@
           <a:p>
             <a:r>
               <a:rPr lang="en-US" dirty="0" smtClean="0"/>
-              <a:t>Stub for Testing</a:t>
+              <a:t>Refactored</a:t>
             </a:r>
             <a:endParaRPr lang="en-US" dirty="0"/>
           </a:p>
@@ -6786,12 +6926,14 @@
         </p:nvSpPr>
         <p:spPr>
           <a:xfrm>
-            <a:off x="1103312" y="2052918"/>
-            <a:ext cx="10001835" cy="4195481"/>
+            <a:off x="1103312" y="1528012"/>
+            <a:ext cx="8946541" cy="4720388"/>
           </a:xfrm>
         </p:spPr>
         <p:txBody>
-          <a:bodyPr/>
+          <a:bodyPr>
+            <a:normAutofit/>
+          </a:bodyPr>
           <a:lstStyle/>
           <a:p>
             <a:pPr marL="0" indent="0">
@@ -6803,7 +6945,7 @@
             </a:r>
             <a:r>
               <a:rPr lang="en-US" dirty="0" err="1"/>
-              <a:t>AlwaysValidFakeExtensionManager</a:t>
+              <a:t>FileExtensionManager</a:t>
             </a:r>
             <a:r>
               <a:rPr lang="en-US" dirty="0"/>
@@ -6821,17 +6963,13 @@
             </a:pPr>
             <a:r>
               <a:rPr lang="en-US" dirty="0"/>
-              <a:t>    {</a:t>
-            </a:r>
-          </a:p>
-          <a:p>
-            <a:pPr marL="0" indent="0">
-              <a:buNone/>
-            </a:pPr>
-            <a:r>
-              <a:rPr lang="en-US" dirty="0"/>
-              <a:t>        //Stub for use in Dependency injection</a:t>
-            </a:r>
+              <a:t>    </a:t>
+            </a:r>
+            <a:r>
+              <a:rPr lang="en-US" dirty="0" smtClean="0"/>
+              <a:t>{</a:t>
+            </a:r>
+            <a:endParaRPr lang="en-US" dirty="0"/>
           </a:p>
           <a:p>
             <a:pPr marL="0" indent="0">
@@ -6872,6 +7010,54 @@
               <a:buNone/>
             </a:pPr>
             <a:r>
+              <a:rPr lang="en-US" dirty="0" smtClean="0"/>
+              <a:t>		   if </a:t>
+            </a:r>
+            <a:r>
+              <a:rPr lang="en-US" dirty="0"/>
+              <a:t>(</a:t>
+            </a:r>
+            <a:r>
+              <a:rPr lang="en-US" dirty="0" err="1"/>
+              <a:t>fileName.EndsWith</a:t>
+            </a:r>
+            <a:r>
+              <a:rPr lang="en-US" dirty="0"/>
+              <a:t>(".foo"))</a:t>
+            </a:r>
+          </a:p>
+          <a:p>
+            <a:pPr marL="0" indent="0">
+              <a:buNone/>
+            </a:pPr>
+            <a:r>
+              <a:rPr lang="en-US" dirty="0"/>
+              <a:t>            {</a:t>
+            </a:r>
+          </a:p>
+          <a:p>
+            <a:pPr marL="0" indent="0">
+              <a:buNone/>
+            </a:pPr>
+            <a:r>
+              <a:rPr lang="en-US" dirty="0"/>
+              <a:t>                return false;</a:t>
+            </a:r>
+          </a:p>
+          <a:p>
+            <a:pPr marL="0" indent="0">
+              <a:buNone/>
+            </a:pPr>
+            <a:r>
+              <a:rPr lang="en-US" dirty="0"/>
+              <a:t>            }</a:t>
+            </a:r>
+          </a:p>
+          <a:p>
+            <a:pPr marL="0" indent="0">
+              <a:buNone/>
+            </a:pPr>
+            <a:r>
               <a:rPr lang="en-US" dirty="0"/>
               <a:t>            return true;</a:t>
             </a:r>
@@ -6893,20 +7079,26 @@
               <a:rPr lang="en-US" dirty="0"/>
               <a:t>    }</a:t>
             </a:r>
-            <a:endParaRPr lang="en-US" dirty="0"/>
           </a:p>
         </p:txBody>
       </p:sp>
     </p:spTree>
     <p:extLst>
       <p:ext uri="{BB962C8B-B14F-4D97-AF65-F5344CB8AC3E}">
-        <p14:creationId xmlns:p14="http://schemas.microsoft.com/office/powerpoint/2010/main" val="2272522962"/>
+        <p14:creationId xmlns:p14="http://schemas.microsoft.com/office/powerpoint/2010/main" val="3015367097"/>
       </p:ext>
     </p:extLst>
   </p:cSld>
   <p:clrMapOvr>
     <a:masterClrMapping/>
   </p:clrMapOvr>
+  <p:timing>
+    <p:tnLst>
+      <p:par>
+        <p:cTn id="1" dur="indefinite" restart="never" nodeType="tmRoot"/>
+      </p:par>
+    </p:tnLst>
+  </p:timing>
 </p:sld>
 </file>
 
@@ -6937,19 +7129,14 @@
             <p:ph type="title"/>
           </p:nvPr>
         </p:nvSpPr>
-        <p:spPr>
-          <a:xfrm>
-            <a:off x="646111" y="452718"/>
-            <a:ext cx="10182310" cy="1400530"/>
-          </a:xfrm>
-        </p:spPr>
+        <p:spPr/>
         <p:txBody>
           <a:bodyPr/>
           <a:lstStyle/>
           <a:p>
             <a:r>
               <a:rPr lang="en-US" dirty="0" smtClean="0"/>
-              <a:t>Unit Test Using Dependency Injection</a:t>
+              <a:t>Stub for Testing</a:t>
             </a:r>
             <a:endParaRPr lang="en-US" dirty="0"/>
           </a:p>
@@ -6968,50 +7155,75 @@
         <p:spPr>
           <a:xfrm>
             <a:off x="1103312" y="2052918"/>
-            <a:ext cx="10615446" cy="4195481"/>
+            <a:ext cx="10001835" cy="4195481"/>
           </a:xfrm>
         </p:spPr>
         <p:txBody>
-          <a:bodyPr>
-            <a:normAutofit fontScale="92500" lnSpcReduction="20000"/>
-          </a:bodyPr>
+          <a:bodyPr/>
           <a:lstStyle/>
           <a:p>
             <a:pPr marL="0" indent="0">
               <a:buNone/>
             </a:pPr>
             <a:r>
-              <a:rPr lang="en-US" dirty="0" smtClean="0"/>
-              <a:t>	    // </a:t>
-            </a:r>
-            <a:r>
-              <a:rPr lang="en-US" dirty="0"/>
-              <a:t>Arrange</a:t>
-            </a:r>
-          </a:p>
-          <a:p>
-            <a:pPr marL="0" indent="0">
-              <a:buNone/>
-            </a:pPr>
-            <a:r>
-              <a:rPr lang="en-US" dirty="0"/>
-              <a:t>            </a:t>
+              <a:rPr lang="en-US" dirty="0"/>
+              <a:t>public class </a:t>
+            </a:r>
+            <a:r>
+              <a:rPr lang="en-US" dirty="0" err="1"/>
+              <a:t>AlwaysValidFakeExtensionManager</a:t>
+            </a:r>
+            <a:r>
+              <a:rPr lang="en-US" dirty="0"/>
+              <a:t> : </a:t>
             </a:r>
             <a:r>
               <a:rPr lang="en-US" dirty="0" err="1"/>
               <a:t>IFileExtensionManager</a:t>
             </a:r>
-            <a:r>
-              <a:rPr lang="en-US" dirty="0"/>
-              <a:t> manager = new </a:t>
+            <a:endParaRPr lang="en-US" dirty="0"/>
+          </a:p>
+          <a:p>
+            <a:pPr marL="0" indent="0">
+              <a:buNone/>
+            </a:pPr>
+            <a:r>
+              <a:rPr lang="en-US" dirty="0"/>
+              <a:t>    {</a:t>
+            </a:r>
+          </a:p>
+          <a:p>
+            <a:pPr marL="0" indent="0">
+              <a:buNone/>
+            </a:pPr>
+            <a:r>
+              <a:rPr lang="en-US" dirty="0"/>
+              <a:t>        //Stub for use in Dependency injection</a:t>
+            </a:r>
+          </a:p>
+          <a:p>
+            <a:pPr marL="0" indent="0">
+              <a:buNone/>
+            </a:pPr>
+            <a:r>
+              <a:rPr lang="en-US" dirty="0"/>
+              <a:t>        public bool </a:t>
             </a:r>
             <a:r>
               <a:rPr lang="en-US" dirty="0" err="1"/>
-              <a:t>AlwaysValidFakeExtensionManager</a:t>
-            </a:r>
-            <a:r>
-              <a:rPr lang="en-US" dirty="0"/>
-              <a:t>();</a:t>
+              <a:t>IsValid</a:t>
+            </a:r>
+            <a:r>
+              <a:rPr lang="en-US" dirty="0"/>
+              <a:t>(string </a:t>
+            </a:r>
+            <a:r>
+              <a:rPr lang="en-US" dirty="0" err="1"/>
+              <a:t>fileName</a:t>
+            </a:r>
+            <a:r>
+              <a:rPr lang="en-US" dirty="0"/>
+              <a:t>)</a:t>
             </a:r>
           </a:p>
           <a:p>
@@ -7020,37 +7232,8 @@
             </a:pPr>
             <a:r>
               <a:rPr lang="en-US" dirty="0"/>
-              <a:t>            </a:t>
-            </a:r>
-            <a:r>
-              <a:rPr lang="en-US" dirty="0" err="1"/>
-              <a:t>LoanLogic</a:t>
-            </a:r>
-            <a:r>
-              <a:rPr lang="en-US" dirty="0"/>
-              <a:t> </a:t>
-            </a:r>
-            <a:r>
-              <a:rPr lang="en-US" dirty="0" err="1"/>
-              <a:t>loanLogic</a:t>
-            </a:r>
-            <a:r>
-              <a:rPr lang="en-US" dirty="0"/>
-              <a:t> = new </a:t>
-            </a:r>
-            <a:r>
-              <a:rPr lang="en-US" dirty="0" err="1"/>
-              <a:t>LoanLogic</a:t>
-            </a:r>
-            <a:r>
-              <a:rPr lang="en-US" dirty="0"/>
-              <a:t>(manager</a:t>
-            </a:r>
-            <a:r>
-              <a:rPr lang="en-US" dirty="0" smtClean="0"/>
-              <a:t>);</a:t>
-            </a:r>
-            <a:endParaRPr lang="en-US" dirty="0"/>
+              <a:t>        {</a:t>
+            </a:r>
           </a:p>
           <a:p>
             <a:pPr marL="0" indent="0">
@@ -7058,15 +7241,7 @@
             </a:pPr>
             <a:r>
               <a:rPr lang="en-US" dirty="0"/>
-              <a:t>            string foo =  "</a:t>
-            </a:r>
-            <a:r>
-              <a:rPr lang="en-US" dirty="0" err="1"/>
-              <a:t>kung.foo</a:t>
-            </a:r>
-            <a:r>
-              <a:rPr lang="en-US" dirty="0"/>
-              <a:t>";</a:t>
+              <a:t>            return true;</a:t>
             </a:r>
           </a:p>
           <a:p>
@@ -7075,86 +7250,37 @@
             </a:pPr>
             <a:r>
               <a:rPr lang="en-US" dirty="0"/>
-              <a:t>            bool result = false;</a:t>
+              <a:t>        }</a:t>
             </a:r>
           </a:p>
           <a:p>
             <a:pPr marL="0" indent="0">
               <a:buNone/>
             </a:pPr>
-            <a:endParaRPr lang="en-US" dirty="0"/>
-          </a:p>
-          <a:p>
-            <a:pPr marL="0" indent="0">
-              <a:buNone/>
-            </a:pPr>
-            <a:r>
-              <a:rPr lang="en-US" dirty="0"/>
-              <a:t>            // Act</a:t>
-            </a:r>
-          </a:p>
-          <a:p>
-            <a:pPr marL="0" indent="0">
-              <a:buNone/>
-            </a:pPr>
-            <a:r>
-              <a:rPr lang="en-US" dirty="0"/>
-              <a:t>            result = </a:t>
-            </a:r>
-            <a:r>
-              <a:rPr lang="en-US" dirty="0" err="1"/>
-              <a:t>loanLogic.IsValidLogFileNameREFACTORED</a:t>
-            </a:r>
-            <a:r>
-              <a:rPr lang="en-US" dirty="0"/>
-              <a:t>(foo);</a:t>
-            </a:r>
-          </a:p>
-          <a:p>
-            <a:pPr marL="0" indent="0">
-              <a:buNone/>
-            </a:pPr>
-            <a:endParaRPr lang="en-US" dirty="0"/>
-          </a:p>
-          <a:p>
-            <a:pPr marL="0" indent="0">
-              <a:buNone/>
-            </a:pPr>
-            <a:r>
-              <a:rPr lang="en-US" dirty="0"/>
-              <a:t>            // Assert</a:t>
-            </a:r>
-          </a:p>
-          <a:p>
-            <a:pPr marL="0" indent="0">
-              <a:buNone/>
-            </a:pPr>
-            <a:r>
-              <a:rPr lang="en-US" dirty="0"/>
-              <a:t>            </a:t>
-            </a:r>
-            <a:r>
-              <a:rPr lang="en-US" dirty="0" err="1"/>
-              <a:t>Assert.IsTrue</a:t>
-            </a:r>
-            <a:r>
-              <a:rPr lang="en-US" dirty="0"/>
-              <a:t>(result);</a:t>
-            </a:r>
-            <a:endParaRPr lang="en-US" dirty="0"/>
+            <a:r>
+              <a:rPr lang="en-US" dirty="0"/>
+              <a:t>    }</a:t>
+            </a:r>
           </a:p>
         </p:txBody>
       </p:sp>
     </p:spTree>
     <p:extLst>
       <p:ext uri="{BB962C8B-B14F-4D97-AF65-F5344CB8AC3E}">
-        <p14:creationId xmlns:p14="http://schemas.microsoft.com/office/powerpoint/2010/main" val="3643374265"/>
+        <p14:creationId xmlns:p14="http://schemas.microsoft.com/office/powerpoint/2010/main" val="2272522962"/>
       </p:ext>
     </p:extLst>
   </p:cSld>
   <p:clrMapOvr>
     <a:masterClrMapping/>
   </p:clrMapOvr>
+  <p:timing>
+    <p:tnLst>
+      <p:par>
+        <p:cTn id="1" dur="indefinite" restart="never" nodeType="tmRoot"/>
+      </p:par>
+    </p:tnLst>
+  </p:timing>
 </p:sld>
 </file>
 
@@ -7185,6 +7311,260 @@
             <p:ph type="title"/>
           </p:nvPr>
         </p:nvSpPr>
+        <p:spPr>
+          <a:xfrm>
+            <a:off x="646111" y="452718"/>
+            <a:ext cx="10182310" cy="1400530"/>
+          </a:xfrm>
+        </p:spPr>
+        <p:txBody>
+          <a:bodyPr/>
+          <a:lstStyle/>
+          <a:p>
+            <a:r>
+              <a:rPr lang="en-US" dirty="0" smtClean="0"/>
+              <a:t>Unit Test Using Dependency Injection</a:t>
+            </a:r>
+            <a:endParaRPr lang="en-US" dirty="0"/>
+          </a:p>
+        </p:txBody>
+      </p:sp>
+      <p:sp>
+        <p:nvSpPr>
+          <p:cNvPr id="3" name="Content Placeholder 2"/>
+          <p:cNvSpPr>
+            <a:spLocks noGrp="1"/>
+          </p:cNvSpPr>
+          <p:nvPr>
+            <p:ph idx="1"/>
+          </p:nvPr>
+        </p:nvSpPr>
+        <p:spPr>
+          <a:xfrm>
+            <a:off x="1103312" y="2052918"/>
+            <a:ext cx="10615446" cy="4195481"/>
+          </a:xfrm>
+        </p:spPr>
+        <p:txBody>
+          <a:bodyPr>
+            <a:normAutofit fontScale="92500" lnSpcReduction="20000"/>
+          </a:bodyPr>
+          <a:lstStyle/>
+          <a:p>
+            <a:pPr marL="0" indent="0">
+              <a:buNone/>
+            </a:pPr>
+            <a:r>
+              <a:rPr lang="en-US" dirty="0" smtClean="0"/>
+              <a:t>	    // </a:t>
+            </a:r>
+            <a:r>
+              <a:rPr lang="en-US" dirty="0"/>
+              <a:t>Arrange</a:t>
+            </a:r>
+          </a:p>
+          <a:p>
+            <a:pPr marL="0" indent="0">
+              <a:buNone/>
+            </a:pPr>
+            <a:r>
+              <a:rPr lang="en-US" dirty="0"/>
+              <a:t>            </a:t>
+            </a:r>
+            <a:r>
+              <a:rPr lang="en-US" dirty="0" err="1"/>
+              <a:t>IFileExtensionManager</a:t>
+            </a:r>
+            <a:r>
+              <a:rPr lang="en-US" dirty="0"/>
+              <a:t> manager = new </a:t>
+            </a:r>
+            <a:r>
+              <a:rPr lang="en-US" dirty="0" err="1"/>
+              <a:t>AlwaysValidFakeExtensionManager</a:t>
+            </a:r>
+            <a:r>
+              <a:rPr lang="en-US" dirty="0"/>
+              <a:t>();</a:t>
+            </a:r>
+          </a:p>
+          <a:p>
+            <a:pPr marL="0" indent="0">
+              <a:buNone/>
+            </a:pPr>
+            <a:r>
+              <a:rPr lang="en-US" dirty="0"/>
+              <a:t>            </a:t>
+            </a:r>
+            <a:r>
+              <a:rPr lang="en-US" dirty="0" err="1"/>
+              <a:t>LoanLogic</a:t>
+            </a:r>
+            <a:r>
+              <a:rPr lang="en-US" dirty="0"/>
+              <a:t> </a:t>
+            </a:r>
+            <a:r>
+              <a:rPr lang="en-US" dirty="0" err="1"/>
+              <a:t>loanLogic</a:t>
+            </a:r>
+            <a:r>
+              <a:rPr lang="en-US" dirty="0"/>
+              <a:t> = new </a:t>
+            </a:r>
+            <a:r>
+              <a:rPr lang="en-US" dirty="0" err="1"/>
+              <a:t>LoanLogic</a:t>
+            </a:r>
+            <a:r>
+              <a:rPr lang="en-US" dirty="0"/>
+              <a:t>(manager</a:t>
+            </a:r>
+            <a:r>
+              <a:rPr lang="en-US" dirty="0" smtClean="0"/>
+              <a:t>);</a:t>
+            </a:r>
+            <a:endParaRPr lang="en-US" dirty="0"/>
+          </a:p>
+          <a:p>
+            <a:pPr marL="0" indent="0">
+              <a:buNone/>
+            </a:pPr>
+            <a:r>
+              <a:rPr lang="en-US" dirty="0"/>
+              <a:t>            string foo =  "</a:t>
+            </a:r>
+            <a:r>
+              <a:rPr lang="en-US" dirty="0" err="1"/>
+              <a:t>kung.foo</a:t>
+            </a:r>
+            <a:r>
+              <a:rPr lang="en-US" dirty="0"/>
+              <a:t>";</a:t>
+            </a:r>
+          </a:p>
+          <a:p>
+            <a:pPr marL="0" indent="0">
+              <a:buNone/>
+            </a:pPr>
+            <a:r>
+              <a:rPr lang="en-US" dirty="0"/>
+              <a:t>            bool result = false;</a:t>
+            </a:r>
+          </a:p>
+          <a:p>
+            <a:pPr marL="0" indent="0">
+              <a:buNone/>
+            </a:pPr>
+            <a:endParaRPr lang="en-US" dirty="0"/>
+          </a:p>
+          <a:p>
+            <a:pPr marL="0" indent="0">
+              <a:buNone/>
+            </a:pPr>
+            <a:r>
+              <a:rPr lang="en-US" dirty="0"/>
+              <a:t>            // Act</a:t>
+            </a:r>
+          </a:p>
+          <a:p>
+            <a:pPr marL="0" indent="0">
+              <a:buNone/>
+            </a:pPr>
+            <a:r>
+              <a:rPr lang="en-US" dirty="0"/>
+              <a:t>            result = </a:t>
+            </a:r>
+            <a:r>
+              <a:rPr lang="en-US" dirty="0" err="1"/>
+              <a:t>loanLogic.IsValidLogFileNameREFACTORED</a:t>
+            </a:r>
+            <a:r>
+              <a:rPr lang="en-US" dirty="0"/>
+              <a:t>(foo);</a:t>
+            </a:r>
+          </a:p>
+          <a:p>
+            <a:pPr marL="0" indent="0">
+              <a:buNone/>
+            </a:pPr>
+            <a:endParaRPr lang="en-US" dirty="0"/>
+          </a:p>
+          <a:p>
+            <a:pPr marL="0" indent="0">
+              <a:buNone/>
+            </a:pPr>
+            <a:r>
+              <a:rPr lang="en-US" dirty="0"/>
+              <a:t>            // Assert</a:t>
+            </a:r>
+          </a:p>
+          <a:p>
+            <a:pPr marL="0" indent="0">
+              <a:buNone/>
+            </a:pPr>
+            <a:r>
+              <a:rPr lang="en-US" dirty="0"/>
+              <a:t>            </a:t>
+            </a:r>
+            <a:r>
+              <a:rPr lang="en-US" dirty="0" err="1"/>
+              <a:t>Assert.IsTrue</a:t>
+            </a:r>
+            <a:r>
+              <a:rPr lang="en-US" dirty="0"/>
+              <a:t>(result);</a:t>
+            </a:r>
+          </a:p>
+        </p:txBody>
+      </p:sp>
+    </p:spTree>
+    <p:extLst>
+      <p:ext uri="{BB962C8B-B14F-4D97-AF65-F5344CB8AC3E}">
+        <p14:creationId xmlns:p14="http://schemas.microsoft.com/office/powerpoint/2010/main" val="3643374265"/>
+      </p:ext>
+    </p:extLst>
+  </p:cSld>
+  <p:clrMapOvr>
+    <a:masterClrMapping/>
+  </p:clrMapOvr>
+  <p:timing>
+    <p:tnLst>
+      <p:par>
+        <p:cTn id="1" dur="indefinite" restart="never" nodeType="tmRoot"/>
+      </p:par>
+    </p:tnLst>
+  </p:timing>
+</p:sld>
+</file>
+
+<file path=ppt/slides/slide17.xml><?xml version="1.0" encoding="utf-8"?>
+<p:sld xmlns:a="http://schemas.openxmlformats.org/drawingml/2006/main" xmlns:r="http://schemas.openxmlformats.org/officeDocument/2006/relationships" xmlns:p="http://schemas.openxmlformats.org/presentationml/2006/main">
+  <p:cSld>
+    <p:spTree>
+      <p:nvGrpSpPr>
+        <p:cNvPr id="1" name=""/>
+        <p:cNvGrpSpPr/>
+        <p:nvPr/>
+      </p:nvGrpSpPr>
+      <p:grpSpPr>
+        <a:xfrm>
+          <a:off x="0" y="0"/>
+          <a:ext cx="0" cy="0"/>
+          <a:chOff x="0" y="0"/>
+          <a:chExt cx="0" cy="0"/>
+        </a:xfrm>
+      </p:grpSpPr>
+      <p:sp>
+        <p:nvSpPr>
+          <p:cNvPr id="2" name="Title 1"/>
+          <p:cNvSpPr>
+            <a:spLocks noGrp="1"/>
+          </p:cNvSpPr>
+          <p:nvPr>
+            <p:ph type="title"/>
+          </p:nvPr>
+        </p:nvSpPr>
         <p:spPr/>
         <p:txBody>
           <a:bodyPr/>
@@ -7234,6 +7614,13 @@
   <p:clrMapOvr>
     <a:masterClrMapping/>
   </p:clrMapOvr>
+  <p:timing>
+    <p:tnLst>
+      <p:par>
+        <p:cTn id="1" dur="indefinite" restart="never" nodeType="tmRoot"/>
+      </p:par>
+    </p:tnLst>
+  </p:timing>
 </p:sld>
 </file>
 
@@ -7328,6 +7715,13 @@
   <p:clrMapOvr>
     <a:masterClrMapping/>
   </p:clrMapOvr>
+  <p:timing>
+    <p:tnLst>
+      <p:par>
+        <p:cTn id="1" dur="indefinite" restart="never" nodeType="tmRoot"/>
+      </p:par>
+    </p:tnLst>
+  </p:timing>
 </p:sld>
 </file>
 
@@ -7402,7 +7796,6 @@
               <a:rPr lang="en-US" dirty="0" smtClean="0"/>
               <a:t>)</a:t>
             </a:r>
-            <a:endParaRPr lang="en-US" dirty="0" smtClean="0"/>
           </a:p>
           <a:p>
             <a:r>
@@ -7415,11 +7808,7 @@
             </a:r>
             <a:r>
               <a:rPr lang="en-US" dirty="0" smtClean="0"/>
-              <a:t> </a:t>
-            </a:r>
-            <a:r>
-              <a:rPr lang="en-US" dirty="0" smtClean="0"/>
-              <a:t>Tools</a:t>
+              <a:t> Tools</a:t>
             </a:r>
           </a:p>
           <a:p>
@@ -7441,7 +7830,6 @@
               <a:rPr lang="en-US" dirty="0" smtClean="0"/>
               <a:t>Many others</a:t>
             </a:r>
-            <a:endParaRPr lang="en-US" dirty="0" smtClean="0"/>
           </a:p>
           <a:p>
             <a:endParaRPr lang="en-US" dirty="0"/>
@@ -7458,6 +7846,13 @@
   <p:clrMapOvr>
     <a:masterClrMapping/>
   </p:clrMapOvr>
+  <p:timing>
+    <p:tnLst>
+      <p:par>
+        <p:cTn id="1" dur="indefinite" restart="never" nodeType="tmRoot"/>
+      </p:par>
+    </p:tnLst>
+  </p:timing>
 </p:sld>
 </file>
 
@@ -7575,6 +7970,13 @@
   <p:clrMapOvr>
     <a:masterClrMapping/>
   </p:clrMapOvr>
+  <p:timing>
+    <p:tnLst>
+      <p:par>
+        <p:cTn id="1" dur="indefinite" restart="never" nodeType="tmRoot"/>
+      </p:par>
+    </p:tnLst>
+  </p:timing>
 </p:sld>
 </file>
 
@@ -7675,11 +8077,7 @@
             <a:pPr lvl="1"/>
             <a:r>
               <a:rPr lang="en-US" dirty="0" smtClean="0"/>
-              <a:t>Design Unit Tests around existing </a:t>
-            </a:r>
-            <a:r>
-              <a:rPr lang="en-US" dirty="0" smtClean="0"/>
-              <a:t>code, refactoring </a:t>
+              <a:t>Design Unit Tests around existing code, refactoring </a:t>
             </a:r>
             <a:r>
               <a:rPr lang="en-US" smtClean="0"/>
@@ -7699,6 +8097,13 @@
   <p:clrMapOvr>
     <a:masterClrMapping/>
   </p:clrMapOvr>
+  <p:timing>
+    <p:tnLst>
+      <p:par>
+        <p:cTn id="1" dur="indefinite" restart="never" nodeType="tmRoot"/>
+      </p:par>
+    </p:tnLst>
+  </p:timing>
 </p:sld>
 </file>
 
@@ -7758,8 +8163,18 @@
           <a:lstStyle/>
           <a:p>
             <a:r>
+              <a:rPr lang="en-US" smtClean="0"/>
+              <a:t>Use Repositories</a:t>
+            </a:r>
+          </a:p>
+          <a:p>
+            <a:r>
               <a:rPr lang="en-US" dirty="0" smtClean="0"/>
-              <a:t>Use Interfaces</a:t>
+              <a:t>Use </a:t>
+            </a:r>
+            <a:r>
+              <a:rPr lang="en-US" dirty="0" smtClean="0"/>
+              <a:t>Interfaces</a:t>
             </a:r>
           </a:p>
           <a:p>
@@ -7771,11 +8186,7 @@
           <a:p>
             <a:r>
               <a:rPr lang="en-US" dirty="0" smtClean="0"/>
-              <a:t>Use long, descriptive names for test </a:t>
-            </a:r>
-            <a:r>
-              <a:rPr lang="en-US" dirty="0" smtClean="0"/>
-              <a:t>methods, </a:t>
+              <a:t>Use long, descriptive names for test methods, </a:t>
             </a:r>
             <a:r>
               <a:rPr lang="en-US" dirty="0" err="1"/>
@@ -7789,7 +8200,6 @@
               <a:rPr lang="en-US" dirty="0" smtClean="0"/>
               <a:t> suggests:</a:t>
             </a:r>
-            <a:endParaRPr lang="en-US" dirty="0" smtClean="0"/>
           </a:p>
           <a:p>
             <a:pPr lvl="1"/>
@@ -7821,7 +8231,6 @@
               <a:rPr lang="en-US" dirty="0" smtClean="0"/>
               <a:t>]</a:t>
             </a:r>
-            <a:endParaRPr lang="en-US" dirty="0" smtClean="0"/>
           </a:p>
           <a:p>
             <a:r>
@@ -7852,6 +8261,13 @@
   <p:clrMapOvr>
     <a:masterClrMapping/>
   </p:clrMapOvr>
+  <p:timing>
+    <p:tnLst>
+      <p:par>
+        <p:cTn id="1" dur="indefinite" restart="never" nodeType="tmRoot"/>
+      </p:par>
+    </p:tnLst>
+  </p:timing>
 </p:sld>
 </file>
 
@@ -7889,7 +8305,7 @@
           <a:p>
             <a:r>
               <a:rPr lang="en-US" dirty="0" smtClean="0"/>
-              <a:t>Writing a Unit Test</a:t>
+              <a:t>Before We Begin</a:t>
             </a:r>
             <a:endParaRPr lang="en-US" dirty="0"/>
           </a:p>
@@ -7912,61 +8328,75 @@
           <a:p>
             <a:r>
               <a:rPr lang="en-US" dirty="0" smtClean="0"/>
-              <a:t>ARRANGE</a:t>
-            </a:r>
-          </a:p>
-          <a:p>
-            <a:pPr lvl="1"/>
+              <a:t>From Package Manager (</a:t>
+            </a:r>
+            <a:r>
+              <a:rPr lang="en-US" dirty="0" err="1" smtClean="0"/>
+              <a:t>NuGet</a:t>
+            </a:r>
             <a:r>
               <a:rPr lang="en-US" dirty="0" smtClean="0"/>
-              <a:t>Set up all the items needed for your test</a:t>
-            </a:r>
-          </a:p>
-          <a:p>
-            <a:pPr lvl="1"/>
+              <a:t>), run the following</a:t>
+            </a:r>
+          </a:p>
+          <a:p>
+            <a:r>
+              <a:rPr lang="en-US" dirty="0"/>
+              <a:t>Install-Package </a:t>
+            </a:r>
+            <a:r>
+              <a:rPr lang="en-US" dirty="0" err="1"/>
+              <a:t>NUnit</a:t>
+            </a:r>
+            <a:endParaRPr lang="en-US" dirty="0"/>
+          </a:p>
+          <a:p>
+            <a:r>
+              <a:rPr lang="en-US" dirty="0"/>
+              <a:t>Install-Package </a:t>
+            </a:r>
+            <a:r>
+              <a:rPr lang="en-US" dirty="0" err="1"/>
+              <a:t>Moq</a:t>
+            </a:r>
+            <a:endParaRPr lang="en-US" dirty="0"/>
+          </a:p>
+          <a:p>
+            <a:r>
+              <a:rPr lang="en-US" dirty="0"/>
+              <a:t>Install-Package </a:t>
+            </a:r>
+            <a:r>
+              <a:rPr lang="en-US" dirty="0" err="1" smtClean="0"/>
+              <a:t>NUnit.Mocks</a:t>
+            </a:r>
+            <a:endParaRPr lang="en-US" dirty="0" smtClean="0"/>
+          </a:p>
+          <a:p>
+            <a:endParaRPr lang="en-US" dirty="0"/>
+          </a:p>
+          <a:p>
             <a:r>
               <a:rPr lang="en-US" dirty="0" smtClean="0"/>
-              <a:t>Declare objects and methods</a:t>
-            </a:r>
-          </a:p>
-          <a:p>
-            <a:pPr lvl="1"/>
+              <a:t>We will use Microsoft Unit Test for simplicity, but an </a:t>
+            </a:r>
+            <a:r>
+              <a:rPr lang="en-US" dirty="0" err="1" smtClean="0"/>
+              <a:t>NUnit</a:t>
+            </a:r>
             <a:r>
               <a:rPr lang="en-US" dirty="0" smtClean="0"/>
-              <a:t>Set information in variables</a:t>
-            </a:r>
-          </a:p>
-          <a:p>
-            <a:pPr lvl="1"/>
+              <a:t> example is provided for comparison</a:t>
+            </a:r>
+          </a:p>
+          <a:p>
+            <a:r>
+              <a:rPr lang="en-US" dirty="0" err="1" smtClean="0"/>
+              <a:t>Moq</a:t>
+            </a:r>
             <a:r>
               <a:rPr lang="en-US" dirty="0" smtClean="0"/>
-              <a:t>Mock data</a:t>
-            </a:r>
-          </a:p>
-          <a:p>
-            <a:r>
-              <a:rPr lang="en-US" dirty="0" smtClean="0"/>
-              <a:t>ACT</a:t>
-            </a:r>
-          </a:p>
-          <a:p>
-            <a:pPr lvl="1"/>
-            <a:r>
-              <a:rPr lang="en-US" dirty="0" smtClean="0"/>
-              <a:t>Perform the actions against the objects and/or methods</a:t>
-            </a:r>
-          </a:p>
-          <a:p>
-            <a:r>
-              <a:rPr lang="en-US" dirty="0" smtClean="0"/>
-              <a:t>ASSERT</a:t>
-            </a:r>
-          </a:p>
-          <a:p>
-            <a:pPr lvl="1"/>
-            <a:r>
-              <a:rPr lang="en-US" dirty="0" smtClean="0"/>
-              <a:t>Compare the results with the expected results</a:t>
+              <a:t> is the framework to fake the database calls</a:t>
             </a:r>
             <a:endParaRPr lang="en-US" dirty="0"/>
           </a:p>
@@ -7975,13 +8405,20 @@
     </p:spTree>
     <p:extLst>
       <p:ext uri="{BB962C8B-B14F-4D97-AF65-F5344CB8AC3E}">
-        <p14:creationId xmlns:p14="http://schemas.microsoft.com/office/powerpoint/2010/main" val="2240407187"/>
+        <p14:creationId xmlns:p14="http://schemas.microsoft.com/office/powerpoint/2010/main" val="1456214707"/>
       </p:ext>
     </p:extLst>
   </p:cSld>
   <p:clrMapOvr>
     <a:masterClrMapping/>
   </p:clrMapOvr>
+  <p:timing>
+    <p:tnLst>
+      <p:par>
+        <p:cTn id="1" dur="indefinite" restart="never" nodeType="tmRoot"/>
+      </p:par>
+    </p:tnLst>
+  </p:timing>
 </p:sld>
 </file>
 
@@ -8019,7 +8456,7 @@
           <a:p>
             <a:r>
               <a:rPr lang="en-US" dirty="0" smtClean="0"/>
-              <a:t>Simple Example</a:t>
+              <a:t>Writing a Unit Test</a:t>
             </a:r>
             <a:endParaRPr lang="en-US" dirty="0"/>
           </a:p>
@@ -8035,195 +8472,90 @@
             <p:ph idx="1"/>
           </p:nvPr>
         </p:nvSpPr>
-        <p:spPr>
-          <a:xfrm>
-            <a:off x="1103312" y="1383632"/>
-            <a:ext cx="8946541" cy="4864767"/>
-          </a:xfrm>
-        </p:spPr>
-        <p:txBody>
-          <a:bodyPr>
-            <a:normAutofit fontScale="92500" lnSpcReduction="10000"/>
-          </a:bodyPr>
-          <a:lstStyle/>
-          <a:p>
-            <a:pPr marL="0" indent="0">
-              <a:buNone/>
-            </a:pPr>
-            <a:r>
-              <a:rPr lang="en-US" dirty="0"/>
-              <a:t>[</a:t>
-            </a:r>
-            <a:r>
-              <a:rPr lang="en-US" dirty="0" err="1"/>
-              <a:t>TestMethod</a:t>
-            </a:r>
-            <a:r>
-              <a:rPr lang="en-US" dirty="0"/>
-              <a:t>]</a:t>
-            </a:r>
-          </a:p>
-          <a:p>
-            <a:pPr marL="0" indent="0">
-              <a:buNone/>
-            </a:pPr>
-            <a:r>
-              <a:rPr lang="en-US" dirty="0"/>
-              <a:t>        public void Index()</a:t>
-            </a:r>
-          </a:p>
-          <a:p>
-            <a:pPr marL="0" indent="0">
-              <a:buNone/>
-            </a:pPr>
-            <a:r>
-              <a:rPr lang="en-US" dirty="0"/>
-              <a:t>        {</a:t>
-            </a:r>
-          </a:p>
-          <a:p>
-            <a:pPr marL="0" indent="0">
-              <a:buNone/>
-            </a:pPr>
-            <a:r>
-              <a:rPr lang="en-US" dirty="0"/>
-              <a:t>            // Arrange</a:t>
-            </a:r>
-          </a:p>
-          <a:p>
-            <a:pPr marL="0" indent="0">
-              <a:buNone/>
-            </a:pPr>
-            <a:r>
-              <a:rPr lang="en-US" dirty="0"/>
-              <a:t>            </a:t>
-            </a:r>
-            <a:r>
-              <a:rPr lang="en-US" dirty="0" err="1"/>
-              <a:t>HomeController</a:t>
-            </a:r>
-            <a:r>
-              <a:rPr lang="en-US" dirty="0"/>
-              <a:t> controller = new </a:t>
-            </a:r>
-            <a:r>
-              <a:rPr lang="en-US" dirty="0" err="1"/>
-              <a:t>HomeController</a:t>
-            </a:r>
-            <a:r>
-              <a:rPr lang="en-US" dirty="0"/>
-              <a:t>();</a:t>
-            </a:r>
-          </a:p>
-          <a:p>
-            <a:pPr marL="0" indent="0">
-              <a:buNone/>
-            </a:pPr>
+        <p:spPr/>
+        <p:txBody>
+          <a:bodyPr/>
+          <a:lstStyle/>
+          <a:p>
+            <a:r>
+              <a:rPr lang="en-US" dirty="0" smtClean="0"/>
+              <a:t>ARRANGE</a:t>
+            </a:r>
+          </a:p>
+          <a:p>
+            <a:pPr lvl="1"/>
+            <a:r>
+              <a:rPr lang="en-US" dirty="0" smtClean="0"/>
+              <a:t>Set up all the items needed for your test</a:t>
+            </a:r>
+          </a:p>
+          <a:p>
+            <a:pPr lvl="1"/>
+            <a:r>
+              <a:rPr lang="en-US" dirty="0" smtClean="0"/>
+              <a:t>Declare objects and methods</a:t>
+            </a:r>
+          </a:p>
+          <a:p>
+            <a:pPr lvl="1"/>
+            <a:r>
+              <a:rPr lang="en-US" dirty="0" smtClean="0"/>
+              <a:t>Set information in variables</a:t>
+            </a:r>
+          </a:p>
+          <a:p>
+            <a:pPr lvl="1"/>
+            <a:r>
+              <a:rPr lang="en-US" dirty="0" smtClean="0"/>
+              <a:t>Mock data</a:t>
+            </a:r>
+          </a:p>
+          <a:p>
+            <a:r>
+              <a:rPr lang="en-US" dirty="0" smtClean="0"/>
+              <a:t>ACT</a:t>
+            </a:r>
+          </a:p>
+          <a:p>
+            <a:pPr lvl="1"/>
+            <a:r>
+              <a:rPr lang="en-US" dirty="0" smtClean="0"/>
+              <a:t>Perform the actions against the objects and/or methods</a:t>
+            </a:r>
+          </a:p>
+          <a:p>
+            <a:r>
+              <a:rPr lang="en-US" dirty="0" smtClean="0"/>
+              <a:t>ASSERT</a:t>
+            </a:r>
+          </a:p>
+          <a:p>
+            <a:pPr lvl="1"/>
+            <a:r>
+              <a:rPr lang="en-US" dirty="0" smtClean="0"/>
+              <a:t>Compare the results with the expected results</a:t>
+            </a:r>
             <a:endParaRPr lang="en-US" dirty="0"/>
-          </a:p>
-          <a:p>
-            <a:pPr marL="0" indent="0">
-              <a:buNone/>
-            </a:pPr>
-            <a:r>
-              <a:rPr lang="en-US" dirty="0"/>
-              <a:t>            // Act</a:t>
-            </a:r>
-          </a:p>
-          <a:p>
-            <a:pPr marL="0" indent="0">
-              <a:buNone/>
-            </a:pPr>
-            <a:r>
-              <a:rPr lang="en-US" dirty="0"/>
-              <a:t>            </a:t>
-            </a:r>
-            <a:r>
-              <a:rPr lang="en-US" dirty="0" err="1"/>
-              <a:t>ViewResult</a:t>
-            </a:r>
-            <a:r>
-              <a:rPr lang="en-US" dirty="0"/>
-              <a:t> result = </a:t>
-            </a:r>
-            <a:r>
-              <a:rPr lang="en-US" dirty="0" err="1"/>
-              <a:t>controller.Index</a:t>
-            </a:r>
-            <a:r>
-              <a:rPr lang="en-US" dirty="0"/>
-              <a:t>() as </a:t>
-            </a:r>
-            <a:r>
-              <a:rPr lang="en-US" dirty="0" err="1"/>
-              <a:t>ViewResult</a:t>
-            </a:r>
-            <a:r>
-              <a:rPr lang="en-US" dirty="0"/>
-              <a:t>;</a:t>
-            </a:r>
-          </a:p>
-          <a:p>
-            <a:pPr marL="0" indent="0">
-              <a:buNone/>
-            </a:pPr>
-            <a:endParaRPr lang="en-US" dirty="0"/>
-          </a:p>
-          <a:p>
-            <a:pPr marL="0" indent="0">
-              <a:buNone/>
-            </a:pPr>
-            <a:r>
-              <a:rPr lang="en-US" dirty="0"/>
-              <a:t>            // Assert</a:t>
-            </a:r>
-          </a:p>
-          <a:p>
-            <a:pPr marL="0" indent="0">
-              <a:buNone/>
-            </a:pPr>
-            <a:r>
-              <a:rPr lang="en-US" dirty="0"/>
-              <a:t>            </a:t>
-            </a:r>
-            <a:r>
-              <a:rPr lang="en-US" dirty="0" err="1"/>
-              <a:t>Assert.AreEqual</a:t>
-            </a:r>
-            <a:r>
-              <a:rPr lang="en-US" dirty="0" smtClean="0"/>
-              <a:t>(“Match This", </a:t>
-            </a:r>
-            <a:r>
-              <a:rPr lang="en-US" dirty="0" err="1"/>
-              <a:t>result.ViewBag.Message</a:t>
-            </a:r>
-            <a:r>
-              <a:rPr lang="en-US" dirty="0"/>
-              <a:t>);</a:t>
-            </a:r>
-          </a:p>
-          <a:p>
-            <a:pPr marL="0" indent="0">
-              <a:buNone/>
-            </a:pPr>
-            <a:r>
-              <a:rPr lang="en-US" dirty="0"/>
-              <a:t>        }</a:t>
-            </a:r>
           </a:p>
         </p:txBody>
       </p:sp>
     </p:spTree>
     <p:extLst>
       <p:ext uri="{BB962C8B-B14F-4D97-AF65-F5344CB8AC3E}">
-        <p14:creationId xmlns:p14="http://schemas.microsoft.com/office/powerpoint/2010/main" val="2776829738"/>
+        <p14:creationId xmlns:p14="http://schemas.microsoft.com/office/powerpoint/2010/main" val="2240407187"/>
       </p:ext>
     </p:extLst>
   </p:cSld>
   <p:clrMapOvr>
     <a:masterClrMapping/>
   </p:clrMapOvr>
+  <p:timing>
+    <p:tnLst>
+      <p:par>
+        <p:cTn id="1" dur="indefinite" restart="never" nodeType="tmRoot"/>
+      </p:par>
+    </p:tnLst>
+  </p:timing>
 </p:sld>
 </file>
 
@@ -8261,7 +8593,7 @@
           <a:p>
             <a:r>
               <a:rPr lang="en-US" dirty="0" smtClean="0"/>
-              <a:t>Data Example</a:t>
+              <a:t>Simple Example</a:t>
             </a:r>
             <a:endParaRPr lang="en-US" dirty="0"/>
           </a:p>
@@ -8279,13 +8611,13 @@
         </p:nvSpPr>
         <p:spPr>
           <a:xfrm>
-            <a:off x="252664" y="1082842"/>
-            <a:ext cx="11754852" cy="5390147"/>
+            <a:off x="1103312" y="1383632"/>
+            <a:ext cx="8946541" cy="4864767"/>
           </a:xfrm>
         </p:spPr>
         <p:txBody>
           <a:bodyPr>
-            <a:normAutofit lnSpcReduction="10000"/>
+            <a:normAutofit fontScale="92500" lnSpcReduction="10000"/>
           </a:bodyPr>
           <a:lstStyle/>
           <a:p>
@@ -8293,12 +8625,16 @@
               <a:buNone/>
             </a:pPr>
             <a:r>
-              <a:rPr lang="en-US" dirty="0" smtClean="0"/>
-              <a:t>		// </a:t>
-            </a:r>
-            <a:r>
-              <a:rPr lang="en-US" dirty="0"/>
-              <a:t>Arrange</a:t>
+              <a:rPr lang="en-US" dirty="0"/>
+              <a:t>[</a:t>
+            </a:r>
+            <a:r>
+              <a:rPr lang="en-US" dirty="0" err="1"/>
+              <a:t>TestMethod</a:t>
+            </a:r>
+            <a:r>
+              <a:rPr lang="en-US" dirty="0"/>
+              <a:t>]</a:t>
             </a:r>
           </a:p>
           <a:p>
@@ -8307,7 +8643,7 @@
             </a:pPr>
             <a:r>
               <a:rPr lang="en-US" dirty="0"/>
-              <a:t>            Repository repo = new Repository();</a:t>
+              <a:t>        public void Index()</a:t>
             </a:r>
           </a:p>
           <a:p>
@@ -8316,178 +8652,41 @@
             </a:pPr>
             <a:r>
               <a:rPr lang="en-US" dirty="0"/>
+              <a:t>        {</a:t>
+            </a:r>
+          </a:p>
+          <a:p>
+            <a:pPr marL="0" indent="0">
+              <a:buNone/>
+            </a:pPr>
+            <a:r>
+              <a:rPr lang="en-US" dirty="0"/>
+              <a:t>            // Arrange</a:t>
+            </a:r>
+          </a:p>
+          <a:p>
+            <a:pPr marL="0" indent="0">
+              <a:buNone/>
+            </a:pPr>
+            <a:r>
+              <a:rPr lang="en-US" dirty="0"/>
               <a:t>            </a:t>
             </a:r>
             <a:r>
               <a:rPr lang="en-US" dirty="0" err="1"/>
-              <a:t>var</a:t>
-            </a:r>
-            <a:r>
-              <a:rPr lang="en-US" dirty="0"/>
-              <a:t> </a:t>
+              <a:t>HomeController</a:t>
+            </a:r>
+            <a:r>
+              <a:rPr lang="en-US" dirty="0"/>
+              <a:t> controller = new </a:t>
             </a:r>
             <a:r>
               <a:rPr lang="en-US" dirty="0" err="1"/>
-              <a:t>mockRepository</a:t>
-            </a:r>
-            <a:r>
-              <a:rPr lang="en-US" dirty="0"/>
-              <a:t> = new Mock&lt;</a:t>
-            </a:r>
-            <a:r>
-              <a:rPr lang="en-US" dirty="0" err="1"/>
-              <a:t>ILoanModelDAL</a:t>
-            </a:r>
-            <a:r>
-              <a:rPr lang="en-US" dirty="0" smtClean="0"/>
-              <a:t>&gt;();</a:t>
-            </a:r>
-          </a:p>
-          <a:p>
-            <a:pPr marL="0" indent="0">
-              <a:buNone/>
-            </a:pPr>
-            <a:r>
-              <a:rPr lang="en-US" dirty="0" smtClean="0"/>
-              <a:t>		</a:t>
-            </a:r>
-            <a:r>
-              <a:rPr lang="en-US" dirty="0" err="1" smtClean="0"/>
-              <a:t>LoanModel</a:t>
-            </a:r>
-            <a:r>
-              <a:rPr lang="en-US" dirty="0" smtClean="0"/>
-              <a:t> </a:t>
-            </a:r>
-            <a:r>
-              <a:rPr lang="en-US" dirty="0"/>
-              <a:t>loan = new </a:t>
-            </a:r>
-            <a:r>
-              <a:rPr lang="en-US" dirty="0" err="1"/>
-              <a:t>LoanModel</a:t>
-            </a:r>
-            <a:r>
-              <a:rPr lang="en-US" dirty="0" smtClean="0"/>
+              <a:t>HomeController</a:t>
+            </a:r>
+            <a:r>
+              <a:rPr lang="en-US" dirty="0"/>
               <a:t>();</a:t>
-            </a:r>
-          </a:p>
-          <a:p>
-            <a:pPr marL="0" indent="0">
-              <a:buNone/>
-            </a:pPr>
-            <a:r>
-              <a:rPr lang="en-US" dirty="0" smtClean="0"/>
-              <a:t>             </a:t>
-            </a:r>
-            <a:r>
-              <a:rPr lang="en-US" dirty="0" err="1" smtClean="0"/>
-              <a:t>loan.LoanID</a:t>
-            </a:r>
-            <a:r>
-              <a:rPr lang="en-US" dirty="0" smtClean="0"/>
-              <a:t> </a:t>
-            </a:r>
-            <a:r>
-              <a:rPr lang="en-US" dirty="0"/>
-              <a:t>= 1;</a:t>
-            </a:r>
-          </a:p>
-          <a:p>
-            <a:pPr marL="0" indent="0">
-              <a:buNone/>
-            </a:pPr>
-            <a:r>
-              <a:rPr lang="en-US" dirty="0"/>
-              <a:t>        </a:t>
-            </a:r>
-            <a:r>
-              <a:rPr lang="en-US" dirty="0" smtClean="0"/>
-              <a:t>	</a:t>
-            </a:r>
-            <a:r>
-              <a:rPr lang="en-US" dirty="0" err="1" smtClean="0"/>
-              <a:t>loan.Amount</a:t>
-            </a:r>
-            <a:r>
-              <a:rPr lang="en-US" dirty="0" smtClean="0"/>
-              <a:t> </a:t>
-            </a:r>
-            <a:r>
-              <a:rPr lang="en-US" dirty="0"/>
-              <a:t>= 100;</a:t>
-            </a:r>
-          </a:p>
-          <a:p>
-            <a:pPr marL="0" indent="0">
-              <a:buNone/>
-            </a:pPr>
-            <a:endParaRPr lang="en-US" dirty="0" smtClean="0"/>
-          </a:p>
-          <a:p>
-            <a:pPr marL="0" indent="0">
-              <a:buNone/>
-            </a:pPr>
-            <a:r>
-              <a:rPr lang="en-US" dirty="0" smtClean="0"/>
-              <a:t>            </a:t>
-            </a:r>
-            <a:r>
-              <a:rPr lang="en-US" dirty="0"/>
-              <a:t>// tell the mock that when </a:t>
-            </a:r>
-            <a:r>
-              <a:rPr lang="en-US" dirty="0" err="1"/>
-              <a:t>LoanSelectByID</a:t>
-            </a:r>
-            <a:r>
-              <a:rPr lang="en-US" dirty="0"/>
-              <a:t> is </a:t>
-            </a:r>
-            <a:r>
-              <a:rPr lang="en-US" dirty="0" smtClean="0"/>
-              <a:t>called </a:t>
-            </a:r>
-            <a:r>
-              <a:rPr lang="en-US" dirty="0"/>
-              <a:t>return the specified Loan</a:t>
-            </a:r>
-          </a:p>
-          <a:p>
-            <a:pPr marL="0" indent="0">
-              <a:buNone/>
-            </a:pPr>
-            <a:r>
-              <a:rPr lang="en-US" dirty="0"/>
-              <a:t>            </a:t>
-            </a:r>
-            <a:r>
-              <a:rPr lang="en-US" dirty="0" err="1"/>
-              <a:t>mockRepository.Setup</a:t>
-            </a:r>
-            <a:r>
-              <a:rPr lang="en-US" dirty="0"/>
-              <a:t>(</a:t>
-            </a:r>
-            <a:r>
-              <a:rPr lang="en-US" dirty="0" err="1"/>
-              <a:t>cr</a:t>
-            </a:r>
-            <a:r>
-              <a:rPr lang="en-US" dirty="0"/>
-              <a:t> =&gt; </a:t>
-            </a:r>
-            <a:r>
-              <a:rPr lang="en-US" dirty="0" err="1"/>
-              <a:t>cr.LoanSelectByID</a:t>
-            </a:r>
-            <a:r>
-              <a:rPr lang="en-US" dirty="0"/>
-              <a:t>(id)).Returns(loan</a:t>
-            </a:r>
-            <a:r>
-              <a:rPr lang="en-US" dirty="0" smtClean="0"/>
-              <a:t>);</a:t>
             </a:r>
           </a:p>
           <a:p>
@@ -8502,7 +8701,7 @@
             </a:pPr>
             <a:r>
               <a:rPr lang="en-US" dirty="0"/>
-              <a:t>            // pass the mocked instance, not the mock itself, to the category</a:t>
+              <a:t>            // Act</a:t>
             </a:r>
           </a:p>
           <a:p>
@@ -8511,32 +8710,80 @@
             </a:pPr>
             <a:r>
               <a:rPr lang="en-US" dirty="0"/>
-              <a:t>            // controller using the Object property</a:t>
+              <a:t>            </a:t>
+            </a:r>
+            <a:r>
+              <a:rPr lang="en-US" dirty="0" err="1"/>
+              <a:t>ViewResult</a:t>
+            </a:r>
+            <a:r>
+              <a:rPr lang="en-US" dirty="0"/>
+              <a:t> result = </a:t>
+            </a:r>
+            <a:r>
+              <a:rPr lang="en-US" dirty="0" err="1"/>
+              <a:t>controller.Index</a:t>
+            </a:r>
+            <a:r>
+              <a:rPr lang="en-US" dirty="0"/>
+              <a:t>() as </a:t>
+            </a:r>
+            <a:r>
+              <a:rPr lang="en-US" dirty="0" err="1"/>
+              <a:t>ViewResult</a:t>
+            </a:r>
+            <a:r>
+              <a:rPr lang="en-US" dirty="0"/>
+              <a:t>;</a:t>
             </a:r>
           </a:p>
           <a:p>
             <a:pPr marL="0" indent="0">
               <a:buNone/>
             </a:pPr>
+            <a:endParaRPr lang="en-US" dirty="0"/>
+          </a:p>
+          <a:p>
+            <a:pPr marL="0" indent="0">
+              <a:buNone/>
+            </a:pPr>
+            <a:r>
+              <a:rPr lang="en-US" dirty="0"/>
+              <a:t>            // Assert</a:t>
+            </a:r>
+          </a:p>
+          <a:p>
+            <a:pPr marL="0" indent="0">
+              <a:buNone/>
+            </a:pPr>
             <a:r>
               <a:rPr lang="en-US" dirty="0"/>
               <a:t>            </a:t>
             </a:r>
             <a:r>
               <a:rPr lang="en-US" dirty="0" err="1"/>
-              <a:t>repo.iLoanModelDAL</a:t>
-            </a:r>
-            <a:r>
-              <a:rPr lang="en-US" dirty="0"/>
-              <a:t> = </a:t>
+              <a:t>Assert.AreEqual</a:t>
+            </a:r>
+            <a:r>
+              <a:rPr lang="en-US" dirty="0" smtClean="0"/>
+              <a:t>(“Match This", </a:t>
             </a:r>
             <a:r>
               <a:rPr lang="en-US" dirty="0" err="1"/>
-              <a:t>mockRepository.Object</a:t>
-            </a:r>
-            <a:r>
-              <a:rPr lang="en-US" dirty="0"/>
-              <a:t>;</a:t>
+              <a:t>result.ViewBag.Message</a:t>
+            </a:r>
+            <a:r>
+              <a:rPr lang="en-US" dirty="0"/>
+              <a:t>);</a:t>
+            </a:r>
+          </a:p>
+          <a:p>
+            <a:pPr marL="0" indent="0">
+              <a:buNone/>
+            </a:pPr>
+            <a:r>
+              <a:rPr lang="en-US" dirty="0"/>
+              <a:t>        }</a:t>
             </a:r>
           </a:p>
         </p:txBody>
@@ -8544,13 +8791,20 @@
     </p:spTree>
     <p:extLst>
       <p:ext uri="{BB962C8B-B14F-4D97-AF65-F5344CB8AC3E}">
-        <p14:creationId xmlns:p14="http://schemas.microsoft.com/office/powerpoint/2010/main" val="2068941965"/>
+        <p14:creationId xmlns:p14="http://schemas.microsoft.com/office/powerpoint/2010/main" val="2776829738"/>
       </p:ext>
     </p:extLst>
   </p:cSld>
   <p:clrMapOvr>
     <a:masterClrMapping/>
   </p:clrMapOvr>
+  <p:timing>
+    <p:tnLst>
+      <p:par>
+        <p:cTn id="1" dur="indefinite" restart="never" nodeType="tmRoot"/>
+      </p:par>
+    </p:tnLst>
+  </p:timing>
 </p:sld>
 </file>
 

</xml_diff>